<commit_message>
minor modifications to ack flow and re-organization of text
</commit_message>
<xml_diff>
--- a/specs/htlc-ack-diagram.pptx
+++ b/specs/htlc-ack-diagram.pptx
@@ -104,6 +104,11 @@
       </a:defRPr>
     </a:lvl9pPr>
   </p:defaultTextStyle>
+  <p:extLst>
+    <p:ext uri="{EFAFB233-063F-42B5-8137-9DF3F51BA10A}">
+      <p15:sldGuideLst xmlns:p15="http://schemas.microsoft.com/office/powerpoint/2012/main"/>
+    </p:ext>
+  </p:extLst>
 </p:presentation>
 </file>
 
@@ -2964,1353 +2969,1364 @@
           <a:chExt cx="0" cy="0"/>
         </a:xfrm>
       </p:grpSpPr>
-      <p:cxnSp>
-        <p:nvCxnSpPr>
-          <p:cNvPr id="5" name="Straight Connector 4"/>
-          <p:cNvCxnSpPr/>
+      <p:grpSp>
+        <p:nvGrpSpPr>
+          <p:cNvPr id="2" name="Group 1"/>
+          <p:cNvGrpSpPr/>
           <p:nvPr/>
-        </p:nvCxnSpPr>
-        <p:spPr>
+        </p:nvGrpSpPr>
+        <p:grpSpPr>
           <a:xfrm>
-            <a:off x="4859569" y="736200"/>
-            <a:ext cx="0" cy="5486400"/>
+            <a:off x="168623" y="27212"/>
+            <a:ext cx="11602945" cy="6195388"/>
+            <a:chOff x="168623" y="27212"/>
+            <a:chExt cx="11602945" cy="6195388"/>
           </a:xfrm>
-          <a:prstGeom prst="line">
-            <a:avLst/>
-          </a:prstGeom>
-          <a:ln w="38100">
-            <a:solidFill>
+        </p:grpSpPr>
+        <p:cxnSp>
+          <p:nvCxnSpPr>
+            <p:cNvPr id="5" name="Straight Connector 4"/>
+            <p:cNvCxnSpPr/>
+            <p:nvPr/>
+          </p:nvCxnSpPr>
+          <p:spPr>
+            <a:xfrm>
+              <a:off x="4859569" y="736200"/>
+              <a:ext cx="0" cy="5486400"/>
+            </a:xfrm>
+            <a:prstGeom prst="line">
+              <a:avLst/>
+            </a:prstGeom>
+            <a:ln w="38100">
+              <a:solidFill>
+                <a:schemeClr val="tx1"/>
+              </a:solidFill>
+            </a:ln>
+            <a:effectLst/>
+          </p:spPr>
+          <p:style>
+            <a:lnRef idx="2">
+              <a:schemeClr val="accent1"/>
+            </a:lnRef>
+            <a:fillRef idx="0">
+              <a:schemeClr val="accent1"/>
+            </a:fillRef>
+            <a:effectRef idx="1">
+              <a:schemeClr val="accent1"/>
+            </a:effectRef>
+            <a:fontRef idx="minor">
               <a:schemeClr val="tx1"/>
-            </a:solidFill>
-          </a:ln>
-          <a:effectLst/>
-        </p:spPr>
-        <p:style>
-          <a:lnRef idx="2">
-            <a:schemeClr val="accent1"/>
-          </a:lnRef>
-          <a:fillRef idx="0">
-            <a:schemeClr val="accent1"/>
-          </a:fillRef>
-          <a:effectRef idx="1">
-            <a:schemeClr val="accent1"/>
-          </a:effectRef>
-          <a:fontRef idx="minor">
-            <a:schemeClr val="tx1"/>
-          </a:fontRef>
-        </p:style>
-      </p:cxnSp>
-      <p:cxnSp>
-        <p:nvCxnSpPr>
-          <p:cNvPr id="6" name="Straight Connector 5"/>
-          <p:cNvCxnSpPr/>
-          <p:nvPr/>
-        </p:nvCxnSpPr>
-        <p:spPr>
-          <a:xfrm>
-            <a:off x="7061222" y="736200"/>
-            <a:ext cx="0" cy="5486400"/>
-          </a:xfrm>
-          <a:prstGeom prst="line">
-            <a:avLst/>
-          </a:prstGeom>
-          <a:ln w="38100">
-            <a:solidFill>
-              <a:srgbClr val="000000"/>
-            </a:solidFill>
-          </a:ln>
-          <a:effectLst/>
-        </p:spPr>
-        <p:style>
-          <a:lnRef idx="2">
-            <a:schemeClr val="accent1"/>
-          </a:lnRef>
-          <a:fillRef idx="0">
-            <a:schemeClr val="accent1"/>
-          </a:fillRef>
-          <a:effectRef idx="1">
-            <a:schemeClr val="accent1"/>
-          </a:effectRef>
-          <a:fontRef idx="minor">
-            <a:schemeClr val="tx1"/>
-          </a:fontRef>
-        </p:style>
-      </p:cxnSp>
-      <p:cxnSp>
-        <p:nvCxnSpPr>
-          <p:cNvPr id="7" name="Straight Arrow Connector 6"/>
-          <p:cNvCxnSpPr/>
-          <p:nvPr/>
-        </p:nvCxnSpPr>
-        <p:spPr>
-          <a:xfrm>
-            <a:off x="4859569" y="1434700"/>
-            <a:ext cx="2184400" cy="667512"/>
-          </a:xfrm>
-          <a:prstGeom prst="straightConnector1">
-            <a:avLst/>
-          </a:prstGeom>
-          <a:ln w="38100">
-            <a:solidFill>
-              <a:srgbClr val="0070C0"/>
-            </a:solidFill>
-            <a:tailEnd type="arrow"/>
-          </a:ln>
-          <a:effectLst/>
-        </p:spPr>
-        <p:style>
-          <a:lnRef idx="2">
-            <a:schemeClr val="accent1"/>
-          </a:lnRef>
-          <a:fillRef idx="0">
-            <a:schemeClr val="accent1"/>
-          </a:fillRef>
-          <a:effectRef idx="1">
-            <a:schemeClr val="accent1"/>
-          </a:effectRef>
-          <a:fontRef idx="minor">
-            <a:schemeClr val="tx1"/>
-          </a:fontRef>
-        </p:style>
-      </p:cxnSp>
-      <p:cxnSp>
-        <p:nvCxnSpPr>
-          <p:cNvPr id="14" name="Straight Arrow Connector 13"/>
-          <p:cNvCxnSpPr/>
-          <p:nvPr/>
-        </p:nvCxnSpPr>
-        <p:spPr>
-          <a:xfrm flipH="1">
-            <a:off x="4859569" y="2767383"/>
-            <a:ext cx="2184400" cy="668870"/>
-          </a:xfrm>
-          <a:prstGeom prst="straightConnector1">
-            <a:avLst/>
-          </a:prstGeom>
-          <a:ln w="38100" cmpd="sng">
-            <a:solidFill>
-              <a:srgbClr val="FF0000"/>
-            </a:solidFill>
-            <a:tailEnd type="arrow"/>
-          </a:ln>
-          <a:effectLst/>
-        </p:spPr>
-        <p:style>
-          <a:lnRef idx="2">
-            <a:schemeClr val="accent1"/>
-          </a:lnRef>
-          <a:fillRef idx="0">
-            <a:schemeClr val="accent1"/>
-          </a:fillRef>
-          <a:effectRef idx="1">
-            <a:schemeClr val="accent1"/>
-          </a:effectRef>
-          <a:fontRef idx="minor">
-            <a:schemeClr val="tx1"/>
-          </a:fontRef>
-        </p:style>
-      </p:cxnSp>
-      <p:sp>
-        <p:nvSpPr>
-          <p:cNvPr id="31" name="TextBox 30"/>
-          <p:cNvSpPr txBox="1"/>
-          <p:nvPr/>
-        </p:nvSpPr>
-        <p:spPr>
-          <a:xfrm rot="1014873">
-            <a:off x="5009858" y="1735441"/>
-            <a:ext cx="1888659" cy="461665"/>
-          </a:xfrm>
-          <a:prstGeom prst="rect">
-            <a:avLst/>
-          </a:prstGeom>
-          <a:noFill/>
-        </p:spPr>
-        <p:txBody>
-          <a:bodyPr wrap="none" rtlCol="0">
-            <a:spAutoFit/>
-          </a:bodyPr>
-          <a:lstStyle/>
-          <a:p>
-            <a:r>
-              <a:rPr lang="en-US" sz="2400" dirty="0" smtClean="0">
+            </a:fontRef>
+          </p:style>
+        </p:cxnSp>
+        <p:cxnSp>
+          <p:nvCxnSpPr>
+            <p:cNvPr id="6" name="Straight Connector 5"/>
+            <p:cNvCxnSpPr/>
+            <p:nvPr/>
+          </p:nvCxnSpPr>
+          <p:spPr>
+            <a:xfrm>
+              <a:off x="7061222" y="736200"/>
+              <a:ext cx="0" cy="5486400"/>
+            </a:xfrm>
+            <a:prstGeom prst="line">
+              <a:avLst/>
+            </a:prstGeom>
+            <a:ln w="38100">
+              <a:solidFill>
+                <a:srgbClr val="000000"/>
+              </a:solidFill>
+            </a:ln>
+            <a:effectLst/>
+          </p:spPr>
+          <p:style>
+            <a:lnRef idx="2">
+              <a:schemeClr val="accent1"/>
+            </a:lnRef>
+            <a:fillRef idx="0">
+              <a:schemeClr val="accent1"/>
+            </a:fillRef>
+            <a:effectRef idx="1">
+              <a:schemeClr val="accent1"/>
+            </a:effectRef>
+            <a:fontRef idx="minor">
+              <a:schemeClr val="tx1"/>
+            </a:fontRef>
+          </p:style>
+        </p:cxnSp>
+        <p:cxnSp>
+          <p:nvCxnSpPr>
+            <p:cNvPr id="7" name="Straight Arrow Connector 6"/>
+            <p:cNvCxnSpPr/>
+            <p:nvPr/>
+          </p:nvCxnSpPr>
+          <p:spPr>
+            <a:xfrm>
+              <a:off x="4859569" y="1434700"/>
+              <a:ext cx="2184400" cy="667512"/>
+            </a:xfrm>
+            <a:prstGeom prst="straightConnector1">
+              <a:avLst/>
+            </a:prstGeom>
+            <a:ln w="38100">
+              <a:solidFill>
+                <a:srgbClr val="0070C0"/>
+              </a:solidFill>
+              <a:tailEnd type="arrow"/>
+            </a:ln>
+            <a:effectLst/>
+          </p:spPr>
+          <p:style>
+            <a:lnRef idx="2">
+              <a:schemeClr val="accent1"/>
+            </a:lnRef>
+            <a:fillRef idx="0">
+              <a:schemeClr val="accent1"/>
+            </a:fillRef>
+            <a:effectRef idx="1">
+              <a:schemeClr val="accent1"/>
+            </a:effectRef>
+            <a:fontRef idx="minor">
+              <a:schemeClr val="tx1"/>
+            </a:fontRef>
+          </p:style>
+        </p:cxnSp>
+        <p:cxnSp>
+          <p:nvCxnSpPr>
+            <p:cNvPr id="14" name="Straight Arrow Connector 13"/>
+            <p:cNvCxnSpPr/>
+            <p:nvPr/>
+          </p:nvCxnSpPr>
+          <p:spPr>
+            <a:xfrm flipH="1">
+              <a:off x="4859569" y="2767383"/>
+              <a:ext cx="2184400" cy="668870"/>
+            </a:xfrm>
+            <a:prstGeom prst="straightConnector1">
+              <a:avLst/>
+            </a:prstGeom>
+            <a:ln w="38100" cmpd="sng">
+              <a:solidFill>
+                <a:srgbClr val="FF0000"/>
+              </a:solidFill>
+              <a:tailEnd type="arrow"/>
+            </a:ln>
+            <a:effectLst/>
+          </p:spPr>
+          <p:style>
+            <a:lnRef idx="2">
+              <a:schemeClr val="accent1"/>
+            </a:lnRef>
+            <a:fillRef idx="0">
+              <a:schemeClr val="accent1"/>
+            </a:fillRef>
+            <a:effectRef idx="1">
+              <a:schemeClr val="accent1"/>
+            </a:effectRef>
+            <a:fontRef idx="minor">
+              <a:schemeClr val="tx1"/>
+            </a:fontRef>
+          </p:style>
+        </p:cxnSp>
+        <p:sp>
+          <p:nvSpPr>
+            <p:cNvPr id="31" name="TextBox 30"/>
+            <p:cNvSpPr txBox="1"/>
+            <p:nvPr/>
+          </p:nvSpPr>
+          <p:spPr>
+            <a:xfrm rot="1014873">
+              <a:off x="5009858" y="1735441"/>
+              <a:ext cx="1888659" cy="461665"/>
+            </a:xfrm>
+            <a:prstGeom prst="rect">
+              <a:avLst/>
+            </a:prstGeom>
+            <a:noFill/>
+          </p:spPr>
+          <p:txBody>
+            <a:bodyPr wrap="none" rtlCol="0">
+              <a:spAutoFit/>
+            </a:bodyPr>
+            <a:lstStyle/>
+            <a:p>
+              <a:r>
+                <a:rPr lang="en-US" sz="2400" dirty="0" smtClean="0">
+                  <a:latin typeface="Gill Sans" charset="0"/>
+                  <a:ea typeface="Gill Sans" charset="0"/>
+                  <a:cs typeface="Gill Sans" charset="0"/>
+                </a:rPr>
+                <a:t>HTLC initiate</a:t>
+              </a:r>
+              <a:endParaRPr lang="en-US" sz="2400" dirty="0">
                 <a:latin typeface="Gill Sans" charset="0"/>
                 <a:ea typeface="Gill Sans" charset="0"/>
                 <a:cs typeface="Gill Sans" charset="0"/>
-              </a:rPr>
-              <a:t>HTLC initiate</a:t>
-            </a:r>
-            <a:endParaRPr lang="en-US" sz="2400" dirty="0">
-              <a:latin typeface="Gill Sans" charset="0"/>
-              <a:ea typeface="Gill Sans" charset="0"/>
-              <a:cs typeface="Gill Sans" charset="0"/>
-            </a:endParaRPr>
-          </a:p>
-        </p:txBody>
-      </p:sp>
-      <p:cxnSp>
-        <p:nvCxnSpPr>
-          <p:cNvPr id="32" name="Straight Arrow Connector 31"/>
-          <p:cNvCxnSpPr/>
-          <p:nvPr/>
-        </p:nvCxnSpPr>
-        <p:spPr>
-          <a:xfrm>
-            <a:off x="4883224" y="3557310"/>
-            <a:ext cx="2184400" cy="667512"/>
-          </a:xfrm>
-          <a:prstGeom prst="straightConnector1">
-            <a:avLst/>
-          </a:prstGeom>
-          <a:ln w="38100">
-            <a:solidFill>
-              <a:srgbClr val="7030A0"/>
-            </a:solidFill>
-            <a:tailEnd type="arrow"/>
-          </a:ln>
-          <a:effectLst/>
-        </p:spPr>
-        <p:style>
-          <a:lnRef idx="2">
-            <a:schemeClr val="accent1"/>
-          </a:lnRef>
-          <a:fillRef idx="0">
-            <a:schemeClr val="accent1"/>
-          </a:fillRef>
-          <a:effectRef idx="1">
-            <a:schemeClr val="accent1"/>
-          </a:effectRef>
-          <a:fontRef idx="minor">
-            <a:schemeClr val="tx1"/>
-          </a:fontRef>
-        </p:style>
-      </p:cxnSp>
-      <p:sp>
-        <p:nvSpPr>
-          <p:cNvPr id="33" name="TextBox 32"/>
-          <p:cNvSpPr txBox="1"/>
-          <p:nvPr/>
-        </p:nvSpPr>
-        <p:spPr>
-          <a:xfrm rot="20506708">
-            <a:off x="5596920" y="3031328"/>
-            <a:ext cx="671979" cy="461665"/>
-          </a:xfrm>
-          <a:prstGeom prst="rect">
-            <a:avLst/>
-          </a:prstGeom>
-          <a:noFill/>
-        </p:spPr>
-        <p:txBody>
-          <a:bodyPr wrap="none" rtlCol="0">
-            <a:spAutoFit/>
-          </a:bodyPr>
-          <a:lstStyle/>
-          <a:p>
-            <a:r>
-              <a:rPr lang="en-US" sz="2400" dirty="0" err="1" smtClean="0">
+              </a:endParaRPr>
+            </a:p>
+          </p:txBody>
+        </p:sp>
+        <p:cxnSp>
+          <p:nvCxnSpPr>
+            <p:cNvPr id="32" name="Straight Arrow Connector 31"/>
+            <p:cNvCxnSpPr/>
+            <p:nvPr/>
+          </p:nvCxnSpPr>
+          <p:spPr>
+            <a:xfrm>
+              <a:off x="4883224" y="3557310"/>
+              <a:ext cx="2184400" cy="667512"/>
+            </a:xfrm>
+            <a:prstGeom prst="straightConnector1">
+              <a:avLst/>
+            </a:prstGeom>
+            <a:ln w="38100">
+              <a:solidFill>
+                <a:srgbClr val="7030A0"/>
+              </a:solidFill>
+              <a:tailEnd type="arrow"/>
+            </a:ln>
+            <a:effectLst/>
+          </p:spPr>
+          <p:style>
+            <a:lnRef idx="2">
+              <a:schemeClr val="accent1"/>
+            </a:lnRef>
+            <a:fillRef idx="0">
+              <a:schemeClr val="accent1"/>
+            </a:fillRef>
+            <a:effectRef idx="1">
+              <a:schemeClr val="accent1"/>
+            </a:effectRef>
+            <a:fontRef idx="minor">
+              <a:schemeClr val="tx1"/>
+            </a:fontRef>
+          </p:style>
+        </p:cxnSp>
+        <p:sp>
+          <p:nvSpPr>
+            <p:cNvPr id="33" name="TextBox 32"/>
+            <p:cNvSpPr txBox="1"/>
+            <p:nvPr/>
+          </p:nvSpPr>
+          <p:spPr>
+            <a:xfrm rot="20506708">
+              <a:off x="5596920" y="3031328"/>
+              <a:ext cx="671979" cy="461665"/>
+            </a:xfrm>
+            <a:prstGeom prst="rect">
+              <a:avLst/>
+            </a:prstGeom>
+            <a:noFill/>
+          </p:spPr>
+          <p:txBody>
+            <a:bodyPr wrap="none" rtlCol="0">
+              <a:spAutoFit/>
+            </a:bodyPr>
+            <a:lstStyle/>
+            <a:p>
+              <a:r>
+                <a:rPr lang="en-US" sz="2400" dirty="0" err="1" smtClean="0">
+                  <a:latin typeface="Gill Sans" charset="0"/>
+                  <a:ea typeface="Gill Sans" charset="0"/>
+                  <a:cs typeface="Gill Sans" charset="0"/>
+                </a:rPr>
+                <a:t>Ack</a:t>
+              </a:r>
+              <a:endParaRPr lang="en-US" sz="2400" dirty="0">
                 <a:latin typeface="Gill Sans" charset="0"/>
                 <a:ea typeface="Gill Sans" charset="0"/>
                 <a:cs typeface="Gill Sans" charset="0"/>
-              </a:rPr>
-              <a:t>A</a:t>
-            </a:r>
-            <a:r>
-              <a:rPr lang="en-US" sz="2400" dirty="0" err="1" smtClean="0">
+              </a:endParaRPr>
+            </a:p>
+          </p:txBody>
+        </p:sp>
+        <p:sp>
+          <p:nvSpPr>
+            <p:cNvPr id="34" name="TextBox 33"/>
+            <p:cNvSpPr txBox="1"/>
+            <p:nvPr/>
+          </p:nvSpPr>
+          <p:spPr>
+            <a:xfrm rot="1014873">
+              <a:off x="4903851" y="3913991"/>
+              <a:ext cx="2119491" cy="461665"/>
+            </a:xfrm>
+            <a:prstGeom prst="rect">
+              <a:avLst/>
+            </a:prstGeom>
+            <a:noFill/>
+          </p:spPr>
+          <p:txBody>
+            <a:bodyPr wrap="none" rtlCol="0">
+              <a:spAutoFit/>
+            </a:bodyPr>
+            <a:lstStyle/>
+            <a:p>
+              <a:r>
+                <a:rPr lang="en-US" sz="2400" dirty="0" smtClean="0">
+                  <a:latin typeface="Gill Sans" charset="0"/>
+                  <a:ea typeface="Gill Sans" charset="0"/>
+                  <a:cs typeface="Gill Sans" charset="0"/>
+                </a:rPr>
+                <a:t>Balance Update</a:t>
+              </a:r>
+              <a:endParaRPr lang="en-US" sz="2400" dirty="0">
                 <a:latin typeface="Gill Sans" charset="0"/>
                 <a:ea typeface="Gill Sans" charset="0"/>
                 <a:cs typeface="Gill Sans" charset="0"/>
-              </a:rPr>
-              <a:t>ck</a:t>
-            </a:r>
-            <a:endParaRPr lang="en-US" sz="2400" dirty="0">
-              <a:latin typeface="Gill Sans" charset="0"/>
-              <a:ea typeface="Gill Sans" charset="0"/>
-              <a:cs typeface="Gill Sans" charset="0"/>
-            </a:endParaRPr>
-          </a:p>
-        </p:txBody>
-      </p:sp>
-      <p:sp>
-        <p:nvSpPr>
-          <p:cNvPr id="34" name="TextBox 33"/>
-          <p:cNvSpPr txBox="1"/>
-          <p:nvPr/>
-        </p:nvSpPr>
-        <p:spPr>
-          <a:xfrm rot="1014873">
-            <a:off x="4903851" y="3913991"/>
-            <a:ext cx="2119491" cy="461665"/>
-          </a:xfrm>
-          <a:prstGeom prst="rect">
-            <a:avLst/>
-          </a:prstGeom>
-          <a:noFill/>
-        </p:spPr>
-        <p:txBody>
-          <a:bodyPr wrap="none" rtlCol="0">
-            <a:spAutoFit/>
-          </a:bodyPr>
-          <a:lstStyle/>
-          <a:p>
-            <a:r>
-              <a:rPr lang="en-US" sz="2400" dirty="0" smtClean="0">
-                <a:latin typeface="Gill Sans" charset="0"/>
-                <a:ea typeface="Gill Sans" charset="0"/>
-                <a:cs typeface="Gill Sans" charset="0"/>
-              </a:rPr>
-              <a:t>Balance Update</a:t>
-            </a:r>
-            <a:endParaRPr lang="en-US" sz="2400" dirty="0">
-              <a:latin typeface="Gill Sans" charset="0"/>
-              <a:ea typeface="Gill Sans" charset="0"/>
-              <a:cs typeface="Gill Sans" charset="0"/>
-            </a:endParaRPr>
-          </a:p>
-        </p:txBody>
-      </p:sp>
-      <p:sp>
-        <p:nvSpPr>
-          <p:cNvPr id="36" name="TextBox 35"/>
-          <p:cNvSpPr txBox="1"/>
-          <p:nvPr/>
-        </p:nvSpPr>
-        <p:spPr>
-          <a:xfrm>
-            <a:off x="4624432" y="27212"/>
-            <a:ext cx="724619" cy="769441"/>
-          </a:xfrm>
-          <a:prstGeom prst="rect">
-            <a:avLst/>
-          </a:prstGeom>
-          <a:noFill/>
-        </p:spPr>
-        <p:txBody>
-          <a:bodyPr wrap="square" rtlCol="0">
-            <a:spAutoFit/>
-          </a:bodyPr>
-          <a:lstStyle/>
-          <a:p>
-            <a:r>
-              <a:rPr lang="en-US" sz="4400" dirty="0">
-                <a:solidFill>
-                  <a:schemeClr val="accent6">
-                    <a:lumMod val="75000"/>
-                  </a:schemeClr>
-                </a:solidFill>
-              </a:rPr>
-              <a:t>A</a:t>
-            </a:r>
-          </a:p>
-        </p:txBody>
-      </p:sp>
-      <p:sp>
-        <p:nvSpPr>
-          <p:cNvPr id="37" name="TextBox 36"/>
-          <p:cNvSpPr txBox="1"/>
-          <p:nvPr/>
-        </p:nvSpPr>
-        <p:spPr>
-          <a:xfrm>
-            <a:off x="6811791" y="38038"/>
-            <a:ext cx="724619" cy="769441"/>
-          </a:xfrm>
-          <a:prstGeom prst="rect">
-            <a:avLst/>
-          </a:prstGeom>
-          <a:noFill/>
-        </p:spPr>
-        <p:txBody>
-          <a:bodyPr wrap="square" rtlCol="0">
-            <a:spAutoFit/>
-          </a:bodyPr>
-          <a:lstStyle/>
-          <a:p>
-            <a:r>
-              <a:rPr lang="en-US" sz="4400" dirty="0">
-                <a:solidFill>
-                  <a:schemeClr val="accent2">
-                    <a:lumMod val="75000"/>
-                  </a:schemeClr>
-                </a:solidFill>
-              </a:rPr>
-              <a:t>B</a:t>
-            </a:r>
-          </a:p>
-        </p:txBody>
-      </p:sp>
-      <p:sp>
-        <p:nvSpPr>
-          <p:cNvPr id="39" name="Rectangular Callout 38"/>
-          <p:cNvSpPr/>
-          <p:nvPr/>
-        </p:nvSpPr>
-        <p:spPr>
-          <a:xfrm>
-            <a:off x="168623" y="446915"/>
-            <a:ext cx="4114800" cy="2569199"/>
-          </a:xfrm>
-          <a:prstGeom prst="wedgeRectCallout">
-            <a:avLst>
-              <a:gd name="adj1" fmla="val 63753"/>
-              <a:gd name="adj2" fmla="val -14285"/>
-            </a:avLst>
-          </a:prstGeom>
-          <a:solidFill>
-            <a:schemeClr val="bg1"/>
-          </a:solidFill>
-          <a:ln>
+              </a:endParaRPr>
+            </a:p>
+          </p:txBody>
+        </p:sp>
+        <p:sp>
+          <p:nvSpPr>
+            <p:cNvPr id="36" name="TextBox 35"/>
+            <p:cNvSpPr txBox="1"/>
+            <p:nvPr/>
+          </p:nvSpPr>
+          <p:spPr>
+            <a:xfrm>
+              <a:off x="4624432" y="27212"/>
+              <a:ext cx="724619" cy="769441"/>
+            </a:xfrm>
+            <a:prstGeom prst="rect">
+              <a:avLst/>
+            </a:prstGeom>
+            <a:noFill/>
+          </p:spPr>
+          <p:txBody>
+            <a:bodyPr wrap="square" rtlCol="0">
+              <a:spAutoFit/>
+            </a:bodyPr>
+            <a:lstStyle/>
+            <a:p>
+              <a:r>
+                <a:rPr lang="en-US" sz="4400" dirty="0">
+                  <a:solidFill>
+                    <a:schemeClr val="accent6">
+                      <a:lumMod val="75000"/>
+                    </a:schemeClr>
+                  </a:solidFill>
+                </a:rPr>
+                <a:t>A</a:t>
+              </a:r>
+            </a:p>
+          </p:txBody>
+        </p:sp>
+        <p:sp>
+          <p:nvSpPr>
+            <p:cNvPr id="37" name="TextBox 36"/>
+            <p:cNvSpPr txBox="1"/>
+            <p:nvPr/>
+          </p:nvSpPr>
+          <p:spPr>
+            <a:xfrm>
+              <a:off x="6811791" y="38038"/>
+              <a:ext cx="724619" cy="769441"/>
+            </a:xfrm>
+            <a:prstGeom prst="rect">
+              <a:avLst/>
+            </a:prstGeom>
+            <a:noFill/>
+          </p:spPr>
+          <p:txBody>
+            <a:bodyPr wrap="square" rtlCol="0">
+              <a:spAutoFit/>
+            </a:bodyPr>
+            <a:lstStyle/>
+            <a:p>
+              <a:r>
+                <a:rPr lang="en-US" sz="4400" dirty="0">
+                  <a:solidFill>
+                    <a:schemeClr val="accent2">
+                      <a:lumMod val="75000"/>
+                    </a:schemeClr>
+                  </a:solidFill>
+                </a:rPr>
+                <a:t>B</a:t>
+              </a:r>
+            </a:p>
+          </p:txBody>
+        </p:sp>
+        <p:sp>
+          <p:nvSpPr>
+            <p:cNvPr id="39" name="Rectangular Callout 38"/>
+            <p:cNvSpPr/>
+            <p:nvPr/>
+          </p:nvSpPr>
+          <p:spPr>
+            <a:xfrm>
+              <a:off x="168623" y="446915"/>
+              <a:ext cx="4114800" cy="2569199"/>
+            </a:xfrm>
+            <a:prstGeom prst="wedgeRectCallout">
+              <a:avLst>
+                <a:gd name="adj1" fmla="val 63753"/>
+                <a:gd name="adj2" fmla="val -14285"/>
+              </a:avLst>
+            </a:prstGeom>
             <a:solidFill>
-              <a:schemeClr val="tx1"/>
+              <a:schemeClr val="bg1"/>
             </a:solidFill>
-          </a:ln>
-          <a:effectLst/>
-        </p:spPr>
-        <p:style>
-          <a:lnRef idx="2">
-            <a:schemeClr val="accent1">
-              <a:shade val="50000"/>
-            </a:schemeClr>
-          </a:lnRef>
-          <a:fillRef idx="1">
-            <a:schemeClr val="accent1"/>
-          </a:fillRef>
-          <a:effectRef idx="0">
-            <a:schemeClr val="accent1"/>
-          </a:effectRef>
-          <a:fontRef idx="minor">
-            <a:schemeClr val="lt1"/>
-          </a:fontRef>
-        </p:style>
-        <p:txBody>
-          <a:bodyPr rtlCol="0" anchor="ctr"/>
-          <a:lstStyle/>
-          <a:p>
-            <a:pPr algn="ctr"/>
-            <a:r>
-              <a:rPr lang="en-US" dirty="0" smtClean="0">
-                <a:solidFill>
-                  <a:schemeClr val="tx1"/>
-                </a:solidFill>
-                <a:latin typeface="Gill Sans" charset="0"/>
-                <a:ea typeface="Gill Sans" charset="0"/>
-                <a:cs typeface="Gill Sans" charset="0"/>
-              </a:rPr>
-              <a:t>1. Send HTLC ‘t’ with amount ‘x’ to B</a:t>
-            </a:r>
-          </a:p>
-          <a:p>
-            <a:pPr algn="ctr"/>
-            <a:r>
-              <a:rPr lang="en-US" i="1" dirty="0" smtClean="0">
+            <a:ln>
+              <a:solidFill>
+                <a:schemeClr val="tx1"/>
+              </a:solidFill>
+            </a:ln>
+            <a:effectLst/>
+          </p:spPr>
+          <p:style>
+            <a:lnRef idx="2">
+              <a:schemeClr val="accent1">
+                <a:shade val="50000"/>
+              </a:schemeClr>
+            </a:lnRef>
+            <a:fillRef idx="1">
+              <a:schemeClr val="accent1"/>
+            </a:fillRef>
+            <a:effectRef idx="0">
+              <a:schemeClr val="accent1"/>
+            </a:effectRef>
+            <a:fontRef idx="minor">
+              <a:schemeClr val="lt1"/>
+            </a:fontRef>
+          </p:style>
+          <p:txBody>
+            <a:bodyPr rtlCol="0" anchor="ctr"/>
+            <a:lstStyle/>
+            <a:p>
+              <a:pPr algn="ctr"/>
+              <a:r>
+                <a:rPr lang="en-US" dirty="0" smtClean="0">
+                  <a:solidFill>
+                    <a:schemeClr val="tx1"/>
+                  </a:solidFill>
+                  <a:latin typeface="Gill Sans" charset="0"/>
+                  <a:ea typeface="Gill Sans" charset="0"/>
+                  <a:cs typeface="Gill Sans" charset="0"/>
+                </a:rPr>
+                <a:t>1. Send HTLC ‘t’ with amount ‘x’ to B</a:t>
+              </a:r>
+            </a:p>
+            <a:p>
+              <a:pPr algn="ctr"/>
+              <a:r>
+                <a:rPr lang="en-US" i="1" dirty="0" smtClean="0">
+                  <a:solidFill>
+                    <a:schemeClr val="tx1"/>
+                  </a:solidFill>
+                  <a:latin typeface="Gill Sans Light" charset="0"/>
+                  <a:ea typeface="Gill Sans Light" charset="0"/>
+                  <a:cs typeface="Gill Sans Light" charset="0"/>
+                </a:rPr>
+                <a:t>(Invoked after HTLC initiate for ‘t’ has been processed on upstream channel S-A.)</a:t>
+              </a:r>
+            </a:p>
+            <a:p>
+              <a:r>
+                <a:rPr lang="en-US" i="1" dirty="0" smtClean="0">
+                  <a:solidFill>
+                    <a:schemeClr val="tx1"/>
+                  </a:solidFill>
+                  <a:latin typeface="Gill Sans Light" charset="0"/>
+                  <a:ea typeface="Gill Sans Light" charset="0"/>
+                  <a:cs typeface="Gill Sans Light" charset="0"/>
+                </a:rPr>
+                <a:t>If</a:t>
+              </a:r>
+              <a:r>
+                <a:rPr lang="en-US" dirty="0" smtClean="0">
+                  <a:solidFill>
+                    <a:schemeClr val="tx1"/>
+                  </a:solidFill>
+                  <a:latin typeface="Gill Sans Light" charset="0"/>
+                  <a:ea typeface="Gill Sans Light" charset="0"/>
+                  <a:cs typeface="Gill Sans Light" charset="0"/>
+                </a:rPr>
+                <a:t> </a:t>
+              </a:r>
+              <a:r>
+                <a:rPr lang="en-US" dirty="0" smtClean="0">
+                  <a:solidFill>
+                    <a:schemeClr val="accent6">
+                      <a:lumMod val="75000"/>
+                    </a:schemeClr>
+                  </a:solidFill>
+                  <a:latin typeface="Gill Sans Light" charset="0"/>
+                  <a:ea typeface="Gill Sans Light" charset="0"/>
+                  <a:cs typeface="Gill Sans Light" charset="0"/>
+                </a:rPr>
+                <a:t>queue</a:t>
+              </a:r>
+              <a:r>
+                <a:rPr lang="en-US" dirty="0" smtClean="0">
+                  <a:solidFill>
+                    <a:schemeClr val="tx1"/>
+                  </a:solidFill>
+                  <a:latin typeface="Gill Sans Light" charset="0"/>
+                  <a:ea typeface="Gill Sans Light" charset="0"/>
+                  <a:cs typeface="Gill Sans Light" charset="0"/>
+                </a:rPr>
+                <a:t> is empty </a:t>
+              </a:r>
+              <a:r>
+                <a:rPr lang="en-US" i="1" dirty="0" smtClean="0">
+                  <a:solidFill>
+                    <a:schemeClr val="tx1"/>
+                  </a:solidFill>
+                  <a:latin typeface="Gill Sans Light" charset="0"/>
+                  <a:ea typeface="Gill Sans Light" charset="0"/>
+                  <a:cs typeface="Gill Sans Light" charset="0"/>
+                </a:rPr>
+                <a:t>and</a:t>
+              </a:r>
+              <a:r>
+                <a:rPr lang="en-US" dirty="0" smtClean="0">
+                  <a:solidFill>
+                    <a:schemeClr val="tx1"/>
+                  </a:solidFill>
+                  <a:latin typeface="Gill Sans Light" charset="0"/>
+                  <a:ea typeface="Gill Sans Light" charset="0"/>
+                  <a:cs typeface="Gill Sans Light" charset="0"/>
+                </a:rPr>
+                <a:t> </a:t>
+              </a:r>
+              <a:r>
+                <a:rPr lang="en-US" dirty="0">
+                  <a:solidFill>
+                    <a:schemeClr val="accent6">
+                      <a:lumMod val="75000"/>
+                    </a:schemeClr>
+                  </a:solidFill>
+                  <a:latin typeface="Gill Sans Light" charset="0"/>
+                  <a:ea typeface="Gill Sans Light" charset="0"/>
+                  <a:cs typeface="Gill Sans Light" charset="0"/>
+                </a:rPr>
+                <a:t>b</a:t>
+              </a:r>
+              <a:r>
+                <a:rPr lang="en-US" dirty="0" smtClean="0">
+                  <a:solidFill>
+                    <a:schemeClr val="accent6">
+                      <a:lumMod val="75000"/>
+                    </a:schemeClr>
+                  </a:solidFill>
+                  <a:latin typeface="Gill Sans Light" charset="0"/>
+                  <a:ea typeface="Gill Sans Light" charset="0"/>
+                  <a:cs typeface="Gill Sans Light" charset="0"/>
+                </a:rPr>
+                <a:t>alance</a:t>
+              </a:r>
+              <a:r>
+                <a:rPr lang="en-US" dirty="0" smtClean="0">
+                  <a:solidFill>
+                    <a:schemeClr val="tx1"/>
+                  </a:solidFill>
+                  <a:latin typeface="Gill Sans Light" charset="0"/>
+                  <a:ea typeface="Gill Sans Light" charset="0"/>
+                  <a:cs typeface="Gill Sans Light" charset="0"/>
+                </a:rPr>
+                <a:t> &gt;= x </a:t>
+              </a:r>
+            </a:p>
+            <a:p>
+              <a:pPr lvl="1"/>
+              <a:r>
+                <a:rPr lang="en-US" dirty="0">
+                  <a:solidFill>
+                    <a:schemeClr val="accent6">
+                      <a:lumMod val="75000"/>
+                    </a:schemeClr>
+                  </a:solidFill>
+                  <a:latin typeface="Gill Sans Light" charset="0"/>
+                  <a:ea typeface="Gill Sans Light" charset="0"/>
+                  <a:cs typeface="Gill Sans Light" charset="0"/>
+                </a:rPr>
+                <a:t>b</a:t>
+              </a:r>
+              <a:r>
+                <a:rPr lang="en-US" dirty="0" smtClean="0">
+                  <a:solidFill>
+                    <a:schemeClr val="accent6">
+                      <a:lumMod val="75000"/>
+                    </a:schemeClr>
+                  </a:solidFill>
+                  <a:latin typeface="Gill Sans Light" charset="0"/>
+                  <a:ea typeface="Gill Sans Light" charset="0"/>
+                  <a:cs typeface="Gill Sans Light" charset="0"/>
+                </a:rPr>
+                <a:t>alance</a:t>
+              </a:r>
+              <a:r>
+                <a:rPr lang="en-US" dirty="0" smtClean="0">
+                  <a:solidFill>
+                    <a:schemeClr val="tx1"/>
+                  </a:solidFill>
+                  <a:latin typeface="Gill Sans Light" charset="0"/>
+                  <a:ea typeface="Gill Sans Light" charset="0"/>
+                  <a:cs typeface="Gill Sans Light" charset="0"/>
+                </a:rPr>
+                <a:t> -= x</a:t>
+              </a:r>
+            </a:p>
+            <a:p>
+              <a:pPr lvl="1"/>
+              <a:r>
+                <a:rPr lang="en-US" dirty="0" smtClean="0">
+                  <a:solidFill>
+                    <a:schemeClr val="tx1"/>
+                  </a:solidFill>
+                  <a:latin typeface="Gill Sans Light" charset="0"/>
+                  <a:ea typeface="Gill Sans Light" charset="0"/>
+                  <a:cs typeface="Gill Sans Light" charset="0"/>
+                </a:rPr>
+                <a:t>Add ‘t’ to </a:t>
+              </a:r>
+              <a:r>
+                <a:rPr lang="en-US" dirty="0" smtClean="0">
+                  <a:solidFill>
+                    <a:schemeClr val="accent6">
+                      <a:lumMod val="75000"/>
+                    </a:schemeClr>
+                  </a:solidFill>
+                  <a:latin typeface="Gill Sans Light" charset="0"/>
+                  <a:ea typeface="Gill Sans Light" charset="0"/>
+                  <a:cs typeface="Gill Sans Light" charset="0"/>
+                </a:rPr>
+                <a:t>in-flight </a:t>
+              </a:r>
+              <a:r>
+                <a:rPr lang="en-US" dirty="0" smtClean="0">
+                  <a:solidFill>
+                    <a:schemeClr val="accent6">
+                      <a:lumMod val="75000"/>
+                    </a:schemeClr>
+                  </a:solidFill>
+                  <a:latin typeface="Gill Sans Light" charset="0"/>
+                  <a:ea typeface="Gill Sans Light" charset="0"/>
+                  <a:cs typeface="Gill Sans Light" charset="0"/>
+                </a:rPr>
+                <a:t>outgoing</a:t>
+              </a:r>
+              <a:r>
+                <a:rPr lang="en-US" dirty="0" smtClean="0">
+                  <a:solidFill>
+                    <a:schemeClr val="tx1"/>
+                  </a:solidFill>
+                  <a:latin typeface="Gill Sans Light" charset="0"/>
+                  <a:ea typeface="Gill Sans Light" charset="0"/>
+                  <a:cs typeface="Gill Sans Light" charset="0"/>
+                </a:rPr>
+                <a:t>.</a:t>
+              </a:r>
+              <a:endParaRPr lang="en-US" dirty="0" smtClean="0">
                 <a:solidFill>
                   <a:schemeClr val="tx1"/>
                 </a:solidFill>
                 <a:latin typeface="Gill Sans Light" charset="0"/>
                 <a:ea typeface="Gill Sans Light" charset="0"/>
                 <a:cs typeface="Gill Sans Light" charset="0"/>
-              </a:rPr>
-              <a:t>(Invoked after HTLC initiate for ‘t’ has been processed on upstream channel S-A.)</a:t>
-            </a:r>
-          </a:p>
-          <a:p>
-            <a:r>
-              <a:rPr lang="en-US" i="1" dirty="0" smtClean="0">
+              </a:endParaRPr>
+            </a:p>
+            <a:p>
+              <a:pPr lvl="1"/>
+              <a:r>
+                <a:rPr lang="en-US" dirty="0" smtClean="0">
+                  <a:solidFill>
+                    <a:schemeClr val="tx1"/>
+                  </a:solidFill>
+                  <a:latin typeface="Gill Sans Light" charset="0"/>
+                  <a:ea typeface="Gill Sans Light" charset="0"/>
+                  <a:cs typeface="Gill Sans Light" charset="0"/>
+                </a:rPr>
+                <a:t>Send HTLC initiate for ‘t’ to B. </a:t>
+              </a:r>
+            </a:p>
+            <a:p>
+              <a:r>
+                <a:rPr lang="en-US" i="1" dirty="0" smtClean="0">
+                  <a:solidFill>
+                    <a:schemeClr val="tx1"/>
+                  </a:solidFill>
+                  <a:latin typeface="Gill Sans Light" charset="0"/>
+                  <a:ea typeface="Gill Sans Light" charset="0"/>
+                  <a:cs typeface="Gill Sans Light" charset="0"/>
+                </a:rPr>
+                <a:t>Else</a:t>
+              </a:r>
+              <a:r>
+                <a:rPr lang="en-US" dirty="0" smtClean="0">
+                  <a:solidFill>
+                    <a:schemeClr val="tx1"/>
+                  </a:solidFill>
+                  <a:latin typeface="Gill Sans Light" charset="0"/>
+                  <a:ea typeface="Gill Sans Light" charset="0"/>
+                  <a:cs typeface="Gill Sans Light" charset="0"/>
+                </a:rPr>
+                <a:t> add ‘t’ to </a:t>
+              </a:r>
+              <a:r>
+                <a:rPr lang="en-US" dirty="0" smtClean="0">
+                  <a:solidFill>
+                    <a:schemeClr val="accent6">
+                      <a:lumMod val="75000"/>
+                    </a:schemeClr>
+                  </a:solidFill>
+                  <a:latin typeface="Gill Sans Light" charset="0"/>
+                  <a:ea typeface="Gill Sans Light" charset="0"/>
+                  <a:cs typeface="Gill Sans Light" charset="0"/>
+                </a:rPr>
+                <a:t>queue</a:t>
+              </a:r>
+              <a:r>
+                <a:rPr lang="en-US" dirty="0" smtClean="0">
+                  <a:solidFill>
+                    <a:schemeClr val="tx1"/>
+                  </a:solidFill>
+                  <a:latin typeface="Gill Sans Light" charset="0"/>
+                  <a:ea typeface="Gill Sans Light" charset="0"/>
+                  <a:cs typeface="Gill Sans Light" charset="0"/>
+                </a:rPr>
+                <a:t>.</a:t>
+              </a:r>
+            </a:p>
+          </p:txBody>
+        </p:sp>
+        <p:sp>
+          <p:nvSpPr>
+            <p:cNvPr id="40" name="Rectangular Callout 39"/>
+            <p:cNvSpPr/>
+            <p:nvPr/>
+          </p:nvSpPr>
+          <p:spPr>
+            <a:xfrm>
+              <a:off x="7656768" y="2542925"/>
+              <a:ext cx="4114800" cy="1415076"/>
+            </a:xfrm>
+            <a:prstGeom prst="wedgeRectCallout">
+              <a:avLst>
+                <a:gd name="adj1" fmla="val -64342"/>
+                <a:gd name="adj2" fmla="val -40978"/>
+              </a:avLst>
+            </a:prstGeom>
+            <a:solidFill>
+              <a:schemeClr val="bg1"/>
+            </a:solidFill>
+            <a:ln>
+              <a:solidFill>
+                <a:schemeClr val="tx1"/>
+              </a:solidFill>
+            </a:ln>
+            <a:effectLst/>
+          </p:spPr>
+          <p:style>
+            <a:lnRef idx="2">
+              <a:schemeClr val="accent1">
+                <a:shade val="50000"/>
+              </a:schemeClr>
+            </a:lnRef>
+            <a:fillRef idx="1">
+              <a:schemeClr val="accent1"/>
+            </a:fillRef>
+            <a:effectRef idx="0">
+              <a:schemeClr val="accent1"/>
+            </a:effectRef>
+            <a:fontRef idx="minor">
+              <a:schemeClr val="lt1"/>
+            </a:fontRef>
+          </p:style>
+          <p:txBody>
+            <a:bodyPr rtlCol="0" anchor="ctr"/>
+            <a:lstStyle/>
+            <a:p>
+              <a:pPr algn="ctr"/>
+              <a:r>
+                <a:rPr lang="en-US" dirty="0" smtClean="0">
+                  <a:solidFill>
+                    <a:schemeClr val="tx1"/>
+                  </a:solidFill>
+                  <a:latin typeface="Gill Sans" charset="0"/>
+                  <a:ea typeface="Gill Sans" charset="0"/>
+                  <a:cs typeface="Gill Sans" charset="0"/>
+                </a:rPr>
+                <a:t>3. Send </a:t>
+              </a:r>
+              <a:r>
+                <a:rPr lang="en-US" dirty="0" err="1" smtClean="0">
+                  <a:solidFill>
+                    <a:schemeClr val="tx1"/>
+                  </a:solidFill>
+                  <a:latin typeface="Gill Sans" charset="0"/>
+                  <a:ea typeface="Gill Sans" charset="0"/>
+                  <a:cs typeface="Gill Sans" charset="0"/>
+                </a:rPr>
+                <a:t>Ack</a:t>
+              </a:r>
+              <a:r>
+                <a:rPr lang="en-US" dirty="0" smtClean="0">
+                  <a:solidFill>
+                    <a:schemeClr val="tx1"/>
+                  </a:solidFill>
+                  <a:latin typeface="Gill Sans" charset="0"/>
+                  <a:ea typeface="Gill Sans" charset="0"/>
+                  <a:cs typeface="Gill Sans" charset="0"/>
+                </a:rPr>
+                <a:t> for ‘t’ to A</a:t>
+              </a:r>
+            </a:p>
+            <a:p>
+              <a:pPr algn="ctr"/>
+              <a:r>
+                <a:rPr lang="en-US" i="1" dirty="0" smtClean="0">
+                  <a:solidFill>
+                    <a:schemeClr val="tx1"/>
+                  </a:solidFill>
+                  <a:latin typeface="Gill Sans Light" charset="0"/>
+                  <a:ea typeface="Gill Sans Light" charset="0"/>
+                  <a:cs typeface="Gill Sans Light" charset="0"/>
+                </a:rPr>
+                <a:t>(Invoked after </a:t>
+              </a:r>
+              <a:r>
+                <a:rPr lang="en-US" i="1" dirty="0" err="1" smtClean="0">
+                  <a:solidFill>
+                    <a:schemeClr val="tx1"/>
+                  </a:solidFill>
+                  <a:latin typeface="Gill Sans Light" charset="0"/>
+                  <a:ea typeface="Gill Sans Light" charset="0"/>
+                  <a:cs typeface="Gill Sans Light" charset="0"/>
+                </a:rPr>
+                <a:t>Ack</a:t>
+              </a:r>
+              <a:r>
+                <a:rPr lang="en-US" i="1" dirty="0" smtClean="0">
+                  <a:solidFill>
+                    <a:schemeClr val="tx1"/>
+                  </a:solidFill>
+                  <a:latin typeface="Gill Sans Light" charset="0"/>
+                  <a:ea typeface="Gill Sans Light" charset="0"/>
+                  <a:cs typeface="Gill Sans Light" charset="0"/>
+                </a:rPr>
+                <a:t> for ‘t’ has been processed on downstream channel B-C.)</a:t>
+              </a:r>
+            </a:p>
+            <a:p>
+              <a:r>
+                <a:rPr lang="en-US" dirty="0" smtClean="0">
+                  <a:solidFill>
+                    <a:schemeClr val="tx1"/>
+                  </a:solidFill>
+                  <a:latin typeface="Gill Sans Light" charset="0"/>
+                  <a:ea typeface="Gill Sans Light" charset="0"/>
+                  <a:cs typeface="Gill Sans Light" charset="0"/>
+                </a:rPr>
+                <a:t>Simply forward </a:t>
+              </a:r>
+              <a:r>
+                <a:rPr lang="en-US" dirty="0" err="1" smtClean="0">
+                  <a:solidFill>
+                    <a:schemeClr val="tx1"/>
+                  </a:solidFill>
+                  <a:latin typeface="Gill Sans Light" charset="0"/>
+                  <a:ea typeface="Gill Sans Light" charset="0"/>
+                  <a:cs typeface="Gill Sans Light" charset="0"/>
+                </a:rPr>
+                <a:t>Ack</a:t>
+              </a:r>
+              <a:r>
+                <a:rPr lang="en-US" dirty="0" smtClean="0">
+                  <a:solidFill>
+                    <a:schemeClr val="tx1"/>
+                  </a:solidFill>
+                  <a:latin typeface="Gill Sans Light" charset="0"/>
+                  <a:ea typeface="Gill Sans Light" charset="0"/>
+                  <a:cs typeface="Gill Sans Light" charset="0"/>
+                </a:rPr>
+                <a:t> for ‘t’ to A.</a:t>
+              </a:r>
+            </a:p>
+          </p:txBody>
+        </p:sp>
+        <p:sp>
+          <p:nvSpPr>
+            <p:cNvPr id="41" name="Rectangular Callout 40"/>
+            <p:cNvSpPr/>
+            <p:nvPr/>
+          </p:nvSpPr>
+          <p:spPr>
+            <a:xfrm>
+              <a:off x="7656768" y="787594"/>
+              <a:ext cx="4114800" cy="1393167"/>
+            </a:xfrm>
+            <a:prstGeom prst="wedgeRectCallout">
+              <a:avLst>
+                <a:gd name="adj1" fmla="val -64799"/>
+                <a:gd name="adj2" fmla="val 48401"/>
+              </a:avLst>
+            </a:prstGeom>
+            <a:solidFill>
+              <a:schemeClr val="bg1"/>
+            </a:solidFill>
+            <a:ln>
+              <a:solidFill>
+                <a:schemeClr val="tx1"/>
+              </a:solidFill>
+            </a:ln>
+            <a:effectLst/>
+          </p:spPr>
+          <p:style>
+            <a:lnRef idx="2">
+              <a:schemeClr val="accent1">
+                <a:shade val="50000"/>
+              </a:schemeClr>
+            </a:lnRef>
+            <a:fillRef idx="1">
+              <a:schemeClr val="accent1"/>
+            </a:fillRef>
+            <a:effectRef idx="0">
+              <a:schemeClr val="accent1"/>
+            </a:effectRef>
+            <a:fontRef idx="minor">
+              <a:schemeClr val="lt1"/>
+            </a:fontRef>
+          </p:style>
+          <p:txBody>
+            <a:bodyPr rtlCol="0" anchor="ctr"/>
+            <a:lstStyle/>
+            <a:p>
+              <a:pPr algn="ctr"/>
+              <a:r>
+                <a:rPr lang="en-US" dirty="0" smtClean="0">
+                  <a:solidFill>
+                    <a:schemeClr val="tx1"/>
+                  </a:solidFill>
+                  <a:latin typeface="Gill Sans" charset="0"/>
+                  <a:ea typeface="Gill Sans" charset="0"/>
+                  <a:cs typeface="Gill Sans" charset="0"/>
+                </a:rPr>
+                <a:t>2. Process HTLC initiate for ‘t’ received from A </a:t>
+              </a:r>
+            </a:p>
+            <a:p>
+              <a:r>
+                <a:rPr lang="en-US" dirty="0" smtClean="0">
+                  <a:solidFill>
+                    <a:schemeClr val="tx1"/>
+                  </a:solidFill>
+                  <a:latin typeface="Gill Sans Light" charset="0"/>
+                  <a:ea typeface="Gill Sans Light" charset="0"/>
+                  <a:cs typeface="Gill Sans Light" charset="0"/>
+                </a:rPr>
+                <a:t>Add ‘t’ to </a:t>
+              </a:r>
+              <a:r>
+                <a:rPr lang="en-US" dirty="0" smtClean="0">
+                  <a:solidFill>
+                    <a:schemeClr val="accent2">
+                      <a:lumMod val="75000"/>
+                    </a:schemeClr>
+                  </a:solidFill>
+                  <a:latin typeface="Gill Sans Light" charset="0"/>
+                  <a:ea typeface="Gill Sans Light" charset="0"/>
+                  <a:cs typeface="Gill Sans Light" charset="0"/>
+                </a:rPr>
+                <a:t>in-flight incoming</a:t>
+              </a:r>
+              <a:r>
+                <a:rPr lang="en-US" dirty="0" smtClean="0">
+                  <a:solidFill>
+                    <a:schemeClr val="tx1"/>
+                  </a:solidFill>
+                  <a:latin typeface="Gill Sans Light" charset="0"/>
+                  <a:ea typeface="Gill Sans Light" charset="0"/>
+                  <a:cs typeface="Gill Sans Light" charset="0"/>
+                </a:rPr>
+                <a:t>.</a:t>
+              </a:r>
+            </a:p>
+            <a:p>
+              <a:r>
+                <a:rPr lang="en-US" dirty="0" smtClean="0">
+                  <a:solidFill>
+                    <a:schemeClr val="tx1"/>
+                  </a:solidFill>
+                  <a:latin typeface="Gill Sans Light" charset="0"/>
+                  <a:ea typeface="Gill Sans Light" charset="0"/>
+                  <a:cs typeface="Gill Sans Light" charset="0"/>
+                </a:rPr>
+                <a:t>Find downstream channel B-C.</a:t>
+              </a:r>
+            </a:p>
+            <a:p>
+              <a:r>
+                <a:rPr lang="en-US" dirty="0" smtClean="0">
+                  <a:solidFill>
+                    <a:schemeClr val="tx1"/>
+                  </a:solidFill>
+                  <a:latin typeface="Gill Sans Light" charset="0"/>
+                  <a:ea typeface="Gill Sans Light" charset="0"/>
+                  <a:cs typeface="Gill Sans Light" charset="0"/>
+                </a:rPr>
+                <a:t>Invoke function to send ‘t’ on B-C.</a:t>
+              </a:r>
+            </a:p>
+          </p:txBody>
+        </p:sp>
+        <p:sp>
+          <p:nvSpPr>
+            <p:cNvPr id="42" name="Rectangular Callout 41"/>
+            <p:cNvSpPr/>
+            <p:nvPr/>
+          </p:nvSpPr>
+          <p:spPr>
+            <a:xfrm>
+              <a:off x="178592" y="3533203"/>
+              <a:ext cx="4114800" cy="1252525"/>
+            </a:xfrm>
+            <a:prstGeom prst="wedgeRectCallout">
+              <a:avLst>
+                <a:gd name="adj1" fmla="val 63295"/>
+                <a:gd name="adj2" fmla="val -53214"/>
+              </a:avLst>
+            </a:prstGeom>
+            <a:solidFill>
+              <a:schemeClr val="bg1"/>
+            </a:solidFill>
+            <a:ln>
+              <a:solidFill>
+                <a:schemeClr val="tx1"/>
+              </a:solidFill>
+            </a:ln>
+            <a:effectLst/>
+          </p:spPr>
+          <p:style>
+            <a:lnRef idx="2">
+              <a:schemeClr val="accent1">
+                <a:shade val="50000"/>
+              </a:schemeClr>
+            </a:lnRef>
+            <a:fillRef idx="1">
+              <a:schemeClr val="accent1"/>
+            </a:fillRef>
+            <a:effectRef idx="0">
+              <a:schemeClr val="accent1"/>
+            </a:effectRef>
+            <a:fontRef idx="minor">
+              <a:schemeClr val="lt1"/>
+            </a:fontRef>
+          </p:style>
+          <p:txBody>
+            <a:bodyPr rtlCol="0" anchor="ctr"/>
+            <a:lstStyle/>
+            <a:p>
+              <a:pPr algn="ctr"/>
+              <a:r>
+                <a:rPr lang="en-US" dirty="0" smtClean="0">
+                  <a:solidFill>
+                    <a:schemeClr val="tx1"/>
+                  </a:solidFill>
+                  <a:latin typeface="Gill Sans" charset="0"/>
+                  <a:ea typeface="Gill Sans" charset="0"/>
+                  <a:cs typeface="Gill Sans" charset="0"/>
+                </a:rPr>
+                <a:t>4. Process </a:t>
+              </a:r>
+              <a:r>
+                <a:rPr lang="en-US" dirty="0" err="1" smtClean="0">
+                  <a:solidFill>
+                    <a:schemeClr val="tx1"/>
+                  </a:solidFill>
+                  <a:latin typeface="Gill Sans" charset="0"/>
+                  <a:ea typeface="Gill Sans" charset="0"/>
+                  <a:cs typeface="Gill Sans" charset="0"/>
+                </a:rPr>
+                <a:t>Ack</a:t>
+              </a:r>
+              <a:r>
+                <a:rPr lang="en-US" dirty="0" smtClean="0">
+                  <a:solidFill>
+                    <a:schemeClr val="tx1"/>
+                  </a:solidFill>
+                  <a:latin typeface="Gill Sans" charset="0"/>
+                  <a:ea typeface="Gill Sans" charset="0"/>
+                  <a:cs typeface="Gill Sans" charset="0"/>
+                </a:rPr>
+                <a:t> for ‘t’ received from B </a:t>
+              </a:r>
+            </a:p>
+            <a:p>
+              <a:r>
+                <a:rPr lang="en-US" dirty="0" smtClean="0">
+                  <a:solidFill>
+                    <a:schemeClr val="tx1"/>
+                  </a:solidFill>
+                  <a:latin typeface="Gill Sans Light" charset="0"/>
+                  <a:ea typeface="Gill Sans Light" charset="0"/>
+                  <a:cs typeface="Gill Sans Light" charset="0"/>
+                </a:rPr>
+                <a:t>Remove ‘t’ from </a:t>
+              </a:r>
+              <a:r>
+                <a:rPr lang="en-US" dirty="0" smtClean="0">
+                  <a:solidFill>
+                    <a:schemeClr val="accent6">
+                      <a:lumMod val="75000"/>
+                    </a:schemeClr>
+                  </a:solidFill>
+                  <a:latin typeface="Gill Sans Light" charset="0"/>
+                  <a:ea typeface="Gill Sans Light" charset="0"/>
+                  <a:cs typeface="Gill Sans Light" charset="0"/>
+                </a:rPr>
+                <a:t>in-flight </a:t>
+              </a:r>
+              <a:r>
+                <a:rPr lang="en-US" dirty="0" smtClean="0">
+                  <a:solidFill>
+                    <a:schemeClr val="accent6">
+                      <a:lumMod val="75000"/>
+                    </a:schemeClr>
+                  </a:solidFill>
+                  <a:latin typeface="Gill Sans Light" charset="0"/>
+                  <a:ea typeface="Gill Sans Light" charset="0"/>
+                  <a:cs typeface="Gill Sans Light" charset="0"/>
+                </a:rPr>
+                <a:t>outgoing</a:t>
+              </a:r>
+              <a:r>
+                <a:rPr lang="en-US" dirty="0" smtClean="0">
+                  <a:solidFill>
+                    <a:schemeClr val="tx1"/>
+                  </a:solidFill>
+                  <a:latin typeface="Gill Sans Light" charset="0"/>
+                  <a:ea typeface="Gill Sans Light" charset="0"/>
+                  <a:cs typeface="Gill Sans Light" charset="0"/>
+                </a:rPr>
+                <a:t>.</a:t>
+              </a:r>
+              <a:endParaRPr lang="en-US" dirty="0" smtClean="0">
                 <a:solidFill>
                   <a:schemeClr val="tx1"/>
                 </a:solidFill>
                 <a:latin typeface="Gill Sans Light" charset="0"/>
                 <a:ea typeface="Gill Sans Light" charset="0"/>
                 <a:cs typeface="Gill Sans Light" charset="0"/>
-              </a:rPr>
-              <a:t>If</a:t>
-            </a:r>
-            <a:r>
-              <a:rPr lang="en-US" dirty="0" smtClean="0">
-                <a:solidFill>
-                  <a:schemeClr val="tx1"/>
-                </a:solidFill>
-                <a:latin typeface="Gill Sans Light" charset="0"/>
-                <a:ea typeface="Gill Sans Light" charset="0"/>
-                <a:cs typeface="Gill Sans Light" charset="0"/>
-              </a:rPr>
-              <a:t> </a:t>
-            </a:r>
-            <a:r>
-              <a:rPr lang="en-US" dirty="0" smtClean="0">
-                <a:solidFill>
-                  <a:schemeClr val="accent6">
-                    <a:lumMod val="75000"/>
-                  </a:schemeClr>
-                </a:solidFill>
-                <a:latin typeface="Gill Sans Light" charset="0"/>
-                <a:ea typeface="Gill Sans Light" charset="0"/>
-                <a:cs typeface="Gill Sans Light" charset="0"/>
-              </a:rPr>
-              <a:t>queue</a:t>
-            </a:r>
-            <a:r>
-              <a:rPr lang="en-US" dirty="0" smtClean="0">
-                <a:solidFill>
-                  <a:schemeClr val="tx1"/>
-                </a:solidFill>
-                <a:latin typeface="Gill Sans Light" charset="0"/>
-                <a:ea typeface="Gill Sans Light" charset="0"/>
-                <a:cs typeface="Gill Sans Light" charset="0"/>
-              </a:rPr>
-              <a:t> is empty </a:t>
-            </a:r>
-            <a:r>
-              <a:rPr lang="en-US" i="1" dirty="0" smtClean="0">
-                <a:solidFill>
-                  <a:schemeClr val="tx1"/>
-                </a:solidFill>
-                <a:latin typeface="Gill Sans Light" charset="0"/>
-                <a:ea typeface="Gill Sans Light" charset="0"/>
-                <a:cs typeface="Gill Sans Light" charset="0"/>
-              </a:rPr>
-              <a:t>and</a:t>
-            </a:r>
-            <a:r>
-              <a:rPr lang="en-US" dirty="0" smtClean="0">
-                <a:solidFill>
-                  <a:schemeClr val="tx1"/>
-                </a:solidFill>
-                <a:latin typeface="Gill Sans Light" charset="0"/>
-                <a:ea typeface="Gill Sans Light" charset="0"/>
-                <a:cs typeface="Gill Sans Light" charset="0"/>
-              </a:rPr>
-              <a:t> </a:t>
-            </a:r>
-            <a:r>
-              <a:rPr lang="en-US" dirty="0">
-                <a:solidFill>
-                  <a:schemeClr val="accent6">
-                    <a:lumMod val="75000"/>
-                  </a:schemeClr>
-                </a:solidFill>
-                <a:latin typeface="Gill Sans Light" charset="0"/>
-                <a:ea typeface="Gill Sans Light" charset="0"/>
-                <a:cs typeface="Gill Sans Light" charset="0"/>
-              </a:rPr>
-              <a:t>b</a:t>
-            </a:r>
-            <a:r>
-              <a:rPr lang="en-US" dirty="0" smtClean="0">
-                <a:solidFill>
-                  <a:schemeClr val="accent6">
-                    <a:lumMod val="75000"/>
-                  </a:schemeClr>
-                </a:solidFill>
-                <a:latin typeface="Gill Sans Light" charset="0"/>
-                <a:ea typeface="Gill Sans Light" charset="0"/>
-                <a:cs typeface="Gill Sans Light" charset="0"/>
-              </a:rPr>
-              <a:t>alance</a:t>
-            </a:r>
-            <a:r>
-              <a:rPr lang="en-US" dirty="0" smtClean="0">
-                <a:solidFill>
-                  <a:schemeClr val="tx1"/>
-                </a:solidFill>
-                <a:latin typeface="Gill Sans Light" charset="0"/>
-                <a:ea typeface="Gill Sans Light" charset="0"/>
-                <a:cs typeface="Gill Sans Light" charset="0"/>
-              </a:rPr>
-              <a:t> &gt;= x </a:t>
-            </a:r>
-            <a:endParaRPr lang="en-US" dirty="0" smtClean="0">
+              </a:endParaRPr>
+            </a:p>
+            <a:p>
+              <a:r>
+                <a:rPr lang="en-US" dirty="0" smtClean="0">
+                  <a:solidFill>
+                    <a:schemeClr val="tx1"/>
+                  </a:solidFill>
+                  <a:latin typeface="Gill Sans Light" charset="0"/>
+                  <a:ea typeface="Gill Sans Light" charset="0"/>
+                  <a:cs typeface="Gill Sans Light" charset="0"/>
+                </a:rPr>
+                <a:t>Send Balance Update for ‘t’ to B.</a:t>
+              </a:r>
+            </a:p>
+            <a:p>
+              <a:r>
+                <a:rPr lang="en-US" dirty="0" smtClean="0">
+                  <a:solidFill>
+                    <a:schemeClr val="tx1"/>
+                  </a:solidFill>
+                  <a:latin typeface="Gill Sans Light" charset="0"/>
+                  <a:ea typeface="Gill Sans Light" charset="0"/>
+                  <a:cs typeface="Gill Sans Light" charset="0"/>
+                </a:rPr>
+                <a:t>Send </a:t>
+              </a:r>
+              <a:r>
+                <a:rPr lang="en-US" dirty="0" err="1" smtClean="0">
+                  <a:solidFill>
+                    <a:schemeClr val="tx1"/>
+                  </a:solidFill>
+                  <a:latin typeface="Gill Sans Light" charset="0"/>
+                  <a:ea typeface="Gill Sans Light" charset="0"/>
+                  <a:cs typeface="Gill Sans Light" charset="0"/>
+                </a:rPr>
+                <a:t>Ack</a:t>
+              </a:r>
+              <a:r>
+                <a:rPr lang="en-US" dirty="0" smtClean="0">
+                  <a:solidFill>
+                    <a:schemeClr val="tx1"/>
+                  </a:solidFill>
+                  <a:latin typeface="Gill Sans Light" charset="0"/>
+                  <a:ea typeface="Gill Sans Light" charset="0"/>
+                  <a:cs typeface="Gill Sans Light" charset="0"/>
+                </a:rPr>
+                <a:t> for ‘t’ on channel S-A.</a:t>
+              </a:r>
+            </a:p>
+          </p:txBody>
+        </p:sp>
+        <p:sp>
+          <p:nvSpPr>
+            <p:cNvPr id="43" name="Rectangular Callout 42"/>
+            <p:cNvSpPr/>
+            <p:nvPr/>
+          </p:nvSpPr>
+          <p:spPr>
+            <a:xfrm>
+              <a:off x="7656768" y="4323016"/>
+              <a:ext cx="4114800" cy="1706946"/>
+            </a:xfrm>
+            <a:prstGeom prst="wedgeRectCallout">
+              <a:avLst>
+                <a:gd name="adj1" fmla="val -64274"/>
+                <a:gd name="adj2" fmla="val -49782"/>
+              </a:avLst>
+            </a:prstGeom>
+            <a:solidFill>
+              <a:schemeClr val="bg1"/>
+            </a:solidFill>
+            <a:ln>
               <a:solidFill>
                 <a:schemeClr val="tx1"/>
               </a:solidFill>
-              <a:latin typeface="Gill Sans Light" charset="0"/>
-              <a:ea typeface="Gill Sans Light" charset="0"/>
-              <a:cs typeface="Gill Sans Light" charset="0"/>
-            </a:endParaRPr>
-          </a:p>
-          <a:p>
-            <a:pPr lvl="1"/>
-            <a:r>
-              <a:rPr lang="en-US" dirty="0">
-                <a:solidFill>
-                  <a:schemeClr val="accent6">
-                    <a:lumMod val="75000"/>
-                  </a:schemeClr>
-                </a:solidFill>
-                <a:latin typeface="Gill Sans Light" charset="0"/>
-                <a:ea typeface="Gill Sans Light" charset="0"/>
-                <a:cs typeface="Gill Sans Light" charset="0"/>
-              </a:rPr>
-              <a:t>b</a:t>
-            </a:r>
-            <a:r>
-              <a:rPr lang="en-US" dirty="0" smtClean="0">
-                <a:solidFill>
-                  <a:schemeClr val="accent6">
-                    <a:lumMod val="75000"/>
-                  </a:schemeClr>
-                </a:solidFill>
-                <a:latin typeface="Gill Sans Light" charset="0"/>
-                <a:ea typeface="Gill Sans Light" charset="0"/>
-                <a:cs typeface="Gill Sans Light" charset="0"/>
-              </a:rPr>
-              <a:t>alance</a:t>
-            </a:r>
-            <a:r>
-              <a:rPr lang="en-US" dirty="0" smtClean="0">
-                <a:solidFill>
-                  <a:schemeClr val="tx1"/>
-                </a:solidFill>
-                <a:latin typeface="Gill Sans Light" charset="0"/>
-                <a:ea typeface="Gill Sans Light" charset="0"/>
-                <a:cs typeface="Gill Sans Light" charset="0"/>
-              </a:rPr>
-              <a:t> -= x</a:t>
-            </a:r>
-          </a:p>
-          <a:p>
-            <a:pPr lvl="1"/>
-            <a:r>
-              <a:rPr lang="en-US" dirty="0" smtClean="0">
-                <a:solidFill>
-                  <a:schemeClr val="tx1"/>
-                </a:solidFill>
-                <a:latin typeface="Gill Sans Light" charset="0"/>
-                <a:ea typeface="Gill Sans Light" charset="0"/>
-                <a:cs typeface="Gill Sans Light" charset="0"/>
-              </a:rPr>
-              <a:t>Add ‘t’ to </a:t>
-            </a:r>
-            <a:r>
-              <a:rPr lang="en-US" dirty="0" smtClean="0">
-                <a:solidFill>
-                  <a:schemeClr val="accent6">
-                    <a:lumMod val="75000"/>
-                  </a:schemeClr>
-                </a:solidFill>
-                <a:latin typeface="Gill Sans Light" charset="0"/>
-                <a:ea typeface="Gill Sans Light" charset="0"/>
-                <a:cs typeface="Gill Sans Light" charset="0"/>
-              </a:rPr>
-              <a:t>in-flight outgone</a:t>
-            </a:r>
-            <a:r>
-              <a:rPr lang="en-US" dirty="0" smtClean="0">
-                <a:solidFill>
-                  <a:schemeClr val="tx1"/>
-                </a:solidFill>
-                <a:latin typeface="Gill Sans Light" charset="0"/>
-                <a:ea typeface="Gill Sans Light" charset="0"/>
-                <a:cs typeface="Gill Sans Light" charset="0"/>
-              </a:rPr>
-              <a:t>.</a:t>
-            </a:r>
-          </a:p>
-          <a:p>
-            <a:pPr lvl="1"/>
-            <a:r>
-              <a:rPr lang="en-US" dirty="0" smtClean="0">
-                <a:solidFill>
-                  <a:schemeClr val="tx1"/>
-                </a:solidFill>
-                <a:latin typeface="Gill Sans Light" charset="0"/>
-                <a:ea typeface="Gill Sans Light" charset="0"/>
-                <a:cs typeface="Gill Sans Light" charset="0"/>
-              </a:rPr>
-              <a:t>Send HTLC initiate for ‘t’ to B. </a:t>
-            </a:r>
-          </a:p>
-          <a:p>
-            <a:r>
-              <a:rPr lang="en-US" i="1" dirty="0" smtClean="0">
-                <a:solidFill>
-                  <a:schemeClr val="tx1"/>
-                </a:solidFill>
-                <a:latin typeface="Gill Sans Light" charset="0"/>
-                <a:ea typeface="Gill Sans Light" charset="0"/>
-                <a:cs typeface="Gill Sans Light" charset="0"/>
-              </a:rPr>
-              <a:t>Else</a:t>
-            </a:r>
-            <a:r>
-              <a:rPr lang="en-US" dirty="0" smtClean="0">
-                <a:solidFill>
-                  <a:schemeClr val="tx1"/>
-                </a:solidFill>
-                <a:latin typeface="Gill Sans Light" charset="0"/>
-                <a:ea typeface="Gill Sans Light" charset="0"/>
-                <a:cs typeface="Gill Sans Light" charset="0"/>
-              </a:rPr>
-              <a:t> add ‘t’ to </a:t>
-            </a:r>
-            <a:r>
-              <a:rPr lang="en-US" dirty="0" smtClean="0">
-                <a:solidFill>
-                  <a:schemeClr val="accent6">
-                    <a:lumMod val="75000"/>
-                  </a:schemeClr>
-                </a:solidFill>
-                <a:latin typeface="Gill Sans Light" charset="0"/>
-                <a:ea typeface="Gill Sans Light" charset="0"/>
-                <a:cs typeface="Gill Sans Light" charset="0"/>
-              </a:rPr>
-              <a:t>queue</a:t>
-            </a:r>
-            <a:r>
-              <a:rPr lang="en-US" dirty="0" smtClean="0">
-                <a:solidFill>
-                  <a:schemeClr val="tx1"/>
-                </a:solidFill>
-                <a:latin typeface="Gill Sans Light" charset="0"/>
-                <a:ea typeface="Gill Sans Light" charset="0"/>
-                <a:cs typeface="Gill Sans Light" charset="0"/>
-              </a:rPr>
-              <a:t>.</a:t>
-            </a:r>
-          </a:p>
-        </p:txBody>
-      </p:sp>
-      <p:sp>
-        <p:nvSpPr>
-          <p:cNvPr id="40" name="Rectangular Callout 39"/>
-          <p:cNvSpPr/>
-          <p:nvPr/>
-        </p:nvSpPr>
-        <p:spPr>
-          <a:xfrm>
-            <a:off x="7656768" y="2542925"/>
-            <a:ext cx="4114800" cy="1415076"/>
-          </a:xfrm>
-          <a:prstGeom prst="wedgeRectCallout">
-            <a:avLst>
-              <a:gd name="adj1" fmla="val -64342"/>
-              <a:gd name="adj2" fmla="val -40978"/>
-            </a:avLst>
-          </a:prstGeom>
-          <a:solidFill>
-            <a:schemeClr val="bg1"/>
-          </a:solidFill>
-          <a:ln>
-            <a:solidFill>
-              <a:schemeClr val="tx1"/>
-            </a:solidFill>
-          </a:ln>
-          <a:effectLst/>
-        </p:spPr>
-        <p:style>
-          <a:lnRef idx="2">
-            <a:schemeClr val="accent1">
-              <a:shade val="50000"/>
-            </a:schemeClr>
-          </a:lnRef>
-          <a:fillRef idx="1">
-            <a:schemeClr val="accent1"/>
-          </a:fillRef>
-          <a:effectRef idx="0">
-            <a:schemeClr val="accent1"/>
-          </a:effectRef>
-          <a:fontRef idx="minor">
-            <a:schemeClr val="lt1"/>
-          </a:fontRef>
-        </p:style>
-        <p:txBody>
-          <a:bodyPr rtlCol="0" anchor="ctr"/>
-          <a:lstStyle/>
-          <a:p>
-            <a:pPr algn="ctr"/>
-            <a:r>
-              <a:rPr lang="en-US" dirty="0" smtClean="0">
-                <a:solidFill>
-                  <a:schemeClr val="tx1"/>
-                </a:solidFill>
-                <a:latin typeface="Gill Sans" charset="0"/>
-                <a:ea typeface="Gill Sans" charset="0"/>
-                <a:cs typeface="Gill Sans" charset="0"/>
-              </a:rPr>
-              <a:t>3. Send </a:t>
-            </a:r>
-            <a:r>
-              <a:rPr lang="en-US" dirty="0" err="1" smtClean="0">
-                <a:solidFill>
-                  <a:schemeClr val="tx1"/>
-                </a:solidFill>
-                <a:latin typeface="Gill Sans" charset="0"/>
-                <a:ea typeface="Gill Sans" charset="0"/>
-                <a:cs typeface="Gill Sans" charset="0"/>
-              </a:rPr>
-              <a:t>Ack</a:t>
-            </a:r>
-            <a:r>
-              <a:rPr lang="en-US" dirty="0" smtClean="0">
-                <a:solidFill>
-                  <a:schemeClr val="tx1"/>
-                </a:solidFill>
-                <a:latin typeface="Gill Sans" charset="0"/>
-                <a:ea typeface="Gill Sans" charset="0"/>
-                <a:cs typeface="Gill Sans" charset="0"/>
-              </a:rPr>
-              <a:t> for ‘t’ to A</a:t>
-            </a:r>
-          </a:p>
-          <a:p>
-            <a:pPr algn="ctr"/>
-            <a:r>
-              <a:rPr lang="en-US" i="1" dirty="0" smtClean="0">
-                <a:solidFill>
-                  <a:schemeClr val="tx1"/>
-                </a:solidFill>
-                <a:latin typeface="Gill Sans Light" charset="0"/>
-                <a:ea typeface="Gill Sans Light" charset="0"/>
-                <a:cs typeface="Gill Sans Light" charset="0"/>
-              </a:rPr>
-              <a:t>(Invoked after </a:t>
-            </a:r>
-            <a:r>
-              <a:rPr lang="en-US" i="1" dirty="0" err="1" smtClean="0">
-                <a:solidFill>
-                  <a:schemeClr val="tx1"/>
-                </a:solidFill>
-                <a:latin typeface="Gill Sans Light" charset="0"/>
-                <a:ea typeface="Gill Sans Light" charset="0"/>
-                <a:cs typeface="Gill Sans Light" charset="0"/>
-              </a:rPr>
-              <a:t>Ack</a:t>
-            </a:r>
-            <a:r>
-              <a:rPr lang="en-US" i="1" dirty="0" smtClean="0">
-                <a:solidFill>
-                  <a:schemeClr val="tx1"/>
-                </a:solidFill>
-                <a:latin typeface="Gill Sans Light" charset="0"/>
-                <a:ea typeface="Gill Sans Light" charset="0"/>
-                <a:cs typeface="Gill Sans Light" charset="0"/>
-              </a:rPr>
-              <a:t> for ‘t’ has been processed on downstream channel B-C.)</a:t>
-            </a:r>
-          </a:p>
-          <a:p>
-            <a:r>
-              <a:rPr lang="en-US" dirty="0" smtClean="0">
-                <a:solidFill>
-                  <a:schemeClr val="tx1"/>
-                </a:solidFill>
-                <a:latin typeface="Gill Sans Light" charset="0"/>
-                <a:ea typeface="Gill Sans Light" charset="0"/>
-                <a:cs typeface="Gill Sans Light" charset="0"/>
-              </a:rPr>
-              <a:t>Simply forward </a:t>
-            </a:r>
-            <a:r>
-              <a:rPr lang="en-US" dirty="0" err="1" smtClean="0">
-                <a:solidFill>
-                  <a:schemeClr val="tx1"/>
-                </a:solidFill>
-                <a:latin typeface="Gill Sans Light" charset="0"/>
-                <a:ea typeface="Gill Sans Light" charset="0"/>
-                <a:cs typeface="Gill Sans Light" charset="0"/>
-              </a:rPr>
-              <a:t>Ack</a:t>
-            </a:r>
-            <a:r>
-              <a:rPr lang="en-US" dirty="0" smtClean="0">
-                <a:solidFill>
-                  <a:schemeClr val="tx1"/>
-                </a:solidFill>
-                <a:latin typeface="Gill Sans Light" charset="0"/>
-                <a:ea typeface="Gill Sans Light" charset="0"/>
-                <a:cs typeface="Gill Sans Light" charset="0"/>
-              </a:rPr>
-              <a:t> for ‘t’ to A.</a:t>
-            </a:r>
-          </a:p>
-        </p:txBody>
-      </p:sp>
-      <p:sp>
-        <p:nvSpPr>
-          <p:cNvPr id="41" name="Rectangular Callout 40"/>
-          <p:cNvSpPr/>
-          <p:nvPr/>
-        </p:nvSpPr>
-        <p:spPr>
-          <a:xfrm>
-            <a:off x="7656768" y="787594"/>
-            <a:ext cx="4114800" cy="1393167"/>
-          </a:xfrm>
-          <a:prstGeom prst="wedgeRectCallout">
-            <a:avLst>
-              <a:gd name="adj1" fmla="val -64799"/>
-              <a:gd name="adj2" fmla="val 48401"/>
-            </a:avLst>
-          </a:prstGeom>
-          <a:solidFill>
-            <a:schemeClr val="bg1"/>
-          </a:solidFill>
-          <a:ln>
-            <a:solidFill>
-              <a:schemeClr val="tx1"/>
-            </a:solidFill>
-          </a:ln>
-          <a:effectLst/>
-        </p:spPr>
-        <p:style>
-          <a:lnRef idx="2">
-            <a:schemeClr val="accent1">
-              <a:shade val="50000"/>
-            </a:schemeClr>
-          </a:lnRef>
-          <a:fillRef idx="1">
-            <a:schemeClr val="accent1"/>
-          </a:fillRef>
-          <a:effectRef idx="0">
-            <a:schemeClr val="accent1"/>
-          </a:effectRef>
-          <a:fontRef idx="minor">
-            <a:schemeClr val="lt1"/>
-          </a:fontRef>
-        </p:style>
-        <p:txBody>
-          <a:bodyPr rtlCol="0" anchor="ctr"/>
-          <a:lstStyle/>
-          <a:p>
-            <a:pPr algn="ctr"/>
-            <a:r>
-              <a:rPr lang="en-US" dirty="0" smtClean="0">
-                <a:solidFill>
-                  <a:schemeClr val="tx1"/>
-                </a:solidFill>
-                <a:latin typeface="Gill Sans" charset="0"/>
-                <a:ea typeface="Gill Sans" charset="0"/>
-                <a:cs typeface="Gill Sans" charset="0"/>
-              </a:rPr>
-              <a:t>2. Process HTLC initiate for ‘t’ received from A </a:t>
-            </a:r>
-          </a:p>
-          <a:p>
-            <a:r>
-              <a:rPr lang="en-US" dirty="0" smtClean="0">
-                <a:solidFill>
-                  <a:schemeClr val="tx1"/>
-                </a:solidFill>
-                <a:latin typeface="Gill Sans Light" charset="0"/>
-                <a:ea typeface="Gill Sans Light" charset="0"/>
-                <a:cs typeface="Gill Sans Light" charset="0"/>
-              </a:rPr>
-              <a:t>Add ‘t’ to </a:t>
-            </a:r>
-            <a:r>
-              <a:rPr lang="en-US" dirty="0" smtClean="0">
-                <a:solidFill>
-                  <a:schemeClr val="accent2">
-                    <a:lumMod val="75000"/>
-                  </a:schemeClr>
-                </a:solidFill>
-                <a:latin typeface="Gill Sans Light" charset="0"/>
-                <a:ea typeface="Gill Sans Light" charset="0"/>
-                <a:cs typeface="Gill Sans Light" charset="0"/>
-              </a:rPr>
-              <a:t>in-flight incoming</a:t>
-            </a:r>
-            <a:r>
-              <a:rPr lang="en-US" dirty="0" smtClean="0">
-                <a:solidFill>
-                  <a:schemeClr val="tx1"/>
-                </a:solidFill>
-                <a:latin typeface="Gill Sans Light" charset="0"/>
-                <a:ea typeface="Gill Sans Light" charset="0"/>
-                <a:cs typeface="Gill Sans Light" charset="0"/>
-              </a:rPr>
-              <a:t>.</a:t>
-            </a:r>
-          </a:p>
-          <a:p>
-            <a:r>
-              <a:rPr lang="en-US" dirty="0" smtClean="0">
-                <a:solidFill>
-                  <a:schemeClr val="tx1"/>
-                </a:solidFill>
-                <a:latin typeface="Gill Sans Light" charset="0"/>
-                <a:ea typeface="Gill Sans Light" charset="0"/>
-                <a:cs typeface="Gill Sans Light" charset="0"/>
-              </a:rPr>
-              <a:t>Find downstream channel B-C.</a:t>
-            </a:r>
-          </a:p>
-          <a:p>
-            <a:r>
-              <a:rPr lang="en-US" dirty="0" smtClean="0">
-                <a:solidFill>
-                  <a:schemeClr val="tx1"/>
-                </a:solidFill>
-                <a:latin typeface="Gill Sans Light" charset="0"/>
-                <a:ea typeface="Gill Sans Light" charset="0"/>
-                <a:cs typeface="Gill Sans Light" charset="0"/>
-              </a:rPr>
-              <a:t>Invoke function to send ‘t’ on B-C.</a:t>
-            </a:r>
-          </a:p>
-        </p:txBody>
-      </p:sp>
-      <p:sp>
-        <p:nvSpPr>
-          <p:cNvPr id="42" name="Rectangular Callout 41"/>
-          <p:cNvSpPr/>
-          <p:nvPr/>
-        </p:nvSpPr>
-        <p:spPr>
-          <a:xfrm>
-            <a:off x="178592" y="3533203"/>
-            <a:ext cx="4114800" cy="1252525"/>
-          </a:xfrm>
-          <a:prstGeom prst="wedgeRectCallout">
-            <a:avLst>
-              <a:gd name="adj1" fmla="val 63295"/>
-              <a:gd name="adj2" fmla="val -53214"/>
-            </a:avLst>
-          </a:prstGeom>
-          <a:solidFill>
-            <a:schemeClr val="bg1"/>
-          </a:solidFill>
-          <a:ln>
-            <a:solidFill>
-              <a:schemeClr val="tx1"/>
-            </a:solidFill>
-          </a:ln>
-          <a:effectLst/>
-        </p:spPr>
-        <p:style>
-          <a:lnRef idx="2">
-            <a:schemeClr val="accent1">
-              <a:shade val="50000"/>
-            </a:schemeClr>
-          </a:lnRef>
-          <a:fillRef idx="1">
-            <a:schemeClr val="accent1"/>
-          </a:fillRef>
-          <a:effectRef idx="0">
-            <a:schemeClr val="accent1"/>
-          </a:effectRef>
-          <a:fontRef idx="minor">
-            <a:schemeClr val="lt1"/>
-          </a:fontRef>
-        </p:style>
-        <p:txBody>
-          <a:bodyPr rtlCol="0" anchor="ctr"/>
-          <a:lstStyle/>
-          <a:p>
-            <a:pPr algn="ctr"/>
-            <a:r>
-              <a:rPr lang="en-US" dirty="0" smtClean="0">
-                <a:solidFill>
-                  <a:schemeClr val="tx1"/>
-                </a:solidFill>
-                <a:latin typeface="Gill Sans" charset="0"/>
-                <a:ea typeface="Gill Sans" charset="0"/>
-                <a:cs typeface="Gill Sans" charset="0"/>
-              </a:rPr>
-              <a:t>4. Process </a:t>
-            </a:r>
-            <a:r>
-              <a:rPr lang="en-US" dirty="0" err="1" smtClean="0">
-                <a:solidFill>
-                  <a:schemeClr val="tx1"/>
-                </a:solidFill>
-                <a:latin typeface="Gill Sans" charset="0"/>
-                <a:ea typeface="Gill Sans" charset="0"/>
-                <a:cs typeface="Gill Sans" charset="0"/>
-              </a:rPr>
-              <a:t>Ack</a:t>
-            </a:r>
-            <a:r>
-              <a:rPr lang="en-US" dirty="0" smtClean="0">
-                <a:solidFill>
-                  <a:schemeClr val="tx1"/>
-                </a:solidFill>
-                <a:latin typeface="Gill Sans" charset="0"/>
-                <a:ea typeface="Gill Sans" charset="0"/>
-                <a:cs typeface="Gill Sans" charset="0"/>
-              </a:rPr>
-              <a:t> for ‘t’ received from B </a:t>
-            </a:r>
-          </a:p>
-          <a:p>
-            <a:r>
-              <a:rPr lang="en-US" dirty="0" smtClean="0">
-                <a:solidFill>
-                  <a:schemeClr val="tx1"/>
-                </a:solidFill>
-                <a:latin typeface="Gill Sans Light" charset="0"/>
-                <a:ea typeface="Gill Sans Light" charset="0"/>
-                <a:cs typeface="Gill Sans Light" charset="0"/>
-              </a:rPr>
-              <a:t>Remove ‘t’ from </a:t>
-            </a:r>
-            <a:r>
-              <a:rPr lang="en-US" dirty="0" smtClean="0">
-                <a:solidFill>
-                  <a:schemeClr val="accent6">
-                    <a:lumMod val="75000"/>
-                  </a:schemeClr>
-                </a:solidFill>
-                <a:latin typeface="Gill Sans Light" charset="0"/>
-                <a:ea typeface="Gill Sans Light" charset="0"/>
-                <a:cs typeface="Gill Sans Light" charset="0"/>
-              </a:rPr>
-              <a:t>in-flight outgone</a:t>
-            </a:r>
-            <a:r>
-              <a:rPr lang="en-US" dirty="0" smtClean="0">
-                <a:solidFill>
-                  <a:schemeClr val="tx1"/>
-                </a:solidFill>
-                <a:latin typeface="Gill Sans Light" charset="0"/>
-                <a:ea typeface="Gill Sans Light" charset="0"/>
-                <a:cs typeface="Gill Sans Light" charset="0"/>
-              </a:rPr>
-              <a:t>.</a:t>
-            </a:r>
-          </a:p>
-          <a:p>
-            <a:r>
-              <a:rPr lang="en-US" dirty="0" smtClean="0">
-                <a:solidFill>
-                  <a:schemeClr val="tx1"/>
-                </a:solidFill>
-                <a:latin typeface="Gill Sans Light" charset="0"/>
-                <a:ea typeface="Gill Sans Light" charset="0"/>
-                <a:cs typeface="Gill Sans Light" charset="0"/>
-              </a:rPr>
-              <a:t>Send </a:t>
-            </a:r>
-            <a:r>
-              <a:rPr lang="en-US" dirty="0" smtClean="0">
-                <a:solidFill>
-                  <a:schemeClr val="tx1"/>
-                </a:solidFill>
-                <a:latin typeface="Gill Sans Light" charset="0"/>
-                <a:ea typeface="Gill Sans Light" charset="0"/>
-                <a:cs typeface="Gill Sans Light" charset="0"/>
-              </a:rPr>
-              <a:t>Balance Update</a:t>
-            </a:r>
-            <a:r>
-              <a:rPr lang="en-US" dirty="0" smtClean="0">
-                <a:solidFill>
-                  <a:schemeClr val="tx1"/>
-                </a:solidFill>
-                <a:latin typeface="Gill Sans Light" charset="0"/>
-                <a:ea typeface="Gill Sans Light" charset="0"/>
-                <a:cs typeface="Gill Sans Light" charset="0"/>
-              </a:rPr>
-              <a:t> for ‘t’ to B.</a:t>
-            </a:r>
-          </a:p>
-          <a:p>
-            <a:r>
-              <a:rPr lang="en-US" dirty="0" smtClean="0">
-                <a:solidFill>
-                  <a:schemeClr val="tx1"/>
-                </a:solidFill>
-                <a:latin typeface="Gill Sans Light" charset="0"/>
-                <a:ea typeface="Gill Sans Light" charset="0"/>
-                <a:cs typeface="Gill Sans Light" charset="0"/>
-              </a:rPr>
-              <a:t>Send </a:t>
-            </a:r>
-            <a:r>
-              <a:rPr lang="en-US" dirty="0" err="1" smtClean="0">
-                <a:solidFill>
-                  <a:schemeClr val="tx1"/>
-                </a:solidFill>
-                <a:latin typeface="Gill Sans Light" charset="0"/>
-                <a:ea typeface="Gill Sans Light" charset="0"/>
-                <a:cs typeface="Gill Sans Light" charset="0"/>
-              </a:rPr>
-              <a:t>Ack</a:t>
-            </a:r>
-            <a:r>
-              <a:rPr lang="en-US" dirty="0" smtClean="0">
-                <a:solidFill>
-                  <a:schemeClr val="tx1"/>
-                </a:solidFill>
-                <a:latin typeface="Gill Sans Light" charset="0"/>
-                <a:ea typeface="Gill Sans Light" charset="0"/>
-                <a:cs typeface="Gill Sans Light" charset="0"/>
-              </a:rPr>
-              <a:t> for ‘t’ on channel S-A.</a:t>
-            </a:r>
-          </a:p>
-        </p:txBody>
-      </p:sp>
-      <p:sp>
-        <p:nvSpPr>
-          <p:cNvPr id="43" name="Rectangular Callout 42"/>
-          <p:cNvSpPr/>
-          <p:nvPr/>
-        </p:nvSpPr>
-        <p:spPr>
-          <a:xfrm>
-            <a:off x="7656768" y="4323016"/>
-            <a:ext cx="4114800" cy="1706946"/>
-          </a:xfrm>
-          <a:prstGeom prst="wedgeRectCallout">
-            <a:avLst>
-              <a:gd name="adj1" fmla="val -64274"/>
-              <a:gd name="adj2" fmla="val -49782"/>
-            </a:avLst>
-          </a:prstGeom>
-          <a:solidFill>
-            <a:schemeClr val="bg1"/>
-          </a:solidFill>
-          <a:ln>
-            <a:solidFill>
-              <a:schemeClr val="tx1"/>
-            </a:solidFill>
-          </a:ln>
-          <a:effectLst/>
-        </p:spPr>
-        <p:style>
-          <a:lnRef idx="2">
-            <a:schemeClr val="accent1">
-              <a:shade val="50000"/>
-            </a:schemeClr>
-          </a:lnRef>
-          <a:fillRef idx="1">
-            <a:schemeClr val="accent1"/>
-          </a:fillRef>
-          <a:effectRef idx="0">
-            <a:schemeClr val="accent1"/>
-          </a:effectRef>
-          <a:fontRef idx="minor">
-            <a:schemeClr val="lt1"/>
-          </a:fontRef>
-        </p:style>
-        <p:txBody>
-          <a:bodyPr rtlCol="0" anchor="ctr"/>
-          <a:lstStyle/>
-          <a:p>
-            <a:pPr algn="ctr"/>
-            <a:r>
-              <a:rPr lang="en-US" dirty="0" smtClean="0">
-                <a:solidFill>
-                  <a:schemeClr val="tx1"/>
-                </a:solidFill>
-                <a:latin typeface="Gill Sans" charset="0"/>
-                <a:ea typeface="Gill Sans" charset="0"/>
-                <a:cs typeface="Gill Sans" charset="0"/>
-              </a:rPr>
-              <a:t>5. Process Balance Update for ‘t’ received from A </a:t>
-            </a:r>
-          </a:p>
-          <a:p>
-            <a:r>
-              <a:rPr lang="en-US" dirty="0" smtClean="0">
-                <a:solidFill>
-                  <a:schemeClr val="tx1"/>
-                </a:solidFill>
-                <a:latin typeface="Gill Sans Light" charset="0"/>
-                <a:ea typeface="Gill Sans Light" charset="0"/>
-                <a:cs typeface="Gill Sans Light" charset="0"/>
-              </a:rPr>
-              <a:t>Remove ‘t’ from </a:t>
-            </a:r>
-            <a:r>
-              <a:rPr lang="en-US" dirty="0" smtClean="0">
-                <a:solidFill>
-                  <a:schemeClr val="accent2">
-                    <a:lumMod val="75000"/>
-                  </a:schemeClr>
-                </a:solidFill>
-                <a:latin typeface="Gill Sans Light" charset="0"/>
-                <a:ea typeface="Gill Sans Light" charset="0"/>
-                <a:cs typeface="Gill Sans Light" charset="0"/>
-              </a:rPr>
-              <a:t>in-flight incoming</a:t>
-            </a:r>
-            <a:r>
-              <a:rPr lang="en-US" dirty="0" smtClean="0">
-                <a:solidFill>
-                  <a:schemeClr val="tx1"/>
-                </a:solidFill>
-                <a:latin typeface="Gill Sans Light" charset="0"/>
-                <a:ea typeface="Gill Sans Light" charset="0"/>
-                <a:cs typeface="Gill Sans Light" charset="0"/>
-              </a:rPr>
-              <a:t>.</a:t>
-            </a:r>
-          </a:p>
-          <a:p>
-            <a:r>
-              <a:rPr lang="en-US" dirty="0" smtClean="0">
-                <a:solidFill>
-                  <a:schemeClr val="accent2">
-                    <a:lumMod val="75000"/>
-                  </a:schemeClr>
-                </a:solidFill>
-                <a:latin typeface="Gill Sans Light" charset="0"/>
-                <a:ea typeface="Gill Sans Light" charset="0"/>
-                <a:cs typeface="Gill Sans Light" charset="0"/>
-              </a:rPr>
-              <a:t>balance</a:t>
-            </a:r>
-            <a:r>
-              <a:rPr lang="en-US" dirty="0" smtClean="0">
-                <a:solidFill>
-                  <a:schemeClr val="tx1"/>
-                </a:solidFill>
-                <a:latin typeface="Gill Sans Light" charset="0"/>
-                <a:ea typeface="Gill Sans Light" charset="0"/>
-                <a:cs typeface="Gill Sans Light" charset="0"/>
-              </a:rPr>
-              <a:t> += x</a:t>
-            </a:r>
-            <a:endParaRPr lang="en-US" dirty="0" smtClean="0">
-              <a:solidFill>
-                <a:schemeClr val="tx1"/>
-              </a:solidFill>
-              <a:latin typeface="Gill Sans Light" charset="0"/>
-              <a:ea typeface="Gill Sans Light" charset="0"/>
-              <a:cs typeface="Gill Sans Light" charset="0"/>
-            </a:endParaRPr>
-          </a:p>
-          <a:p>
-            <a:r>
-              <a:rPr lang="en-US" dirty="0" smtClean="0">
-                <a:solidFill>
-                  <a:schemeClr val="tx1"/>
-                </a:solidFill>
-                <a:latin typeface="Gill Sans Light" charset="0"/>
-                <a:ea typeface="Gill Sans Light" charset="0"/>
-                <a:cs typeface="Gill Sans Light" charset="0"/>
-              </a:rPr>
-              <a:t>Send as many HTLC in </a:t>
-            </a:r>
-            <a:r>
-              <a:rPr lang="en-US" dirty="0" smtClean="0">
-                <a:solidFill>
-                  <a:schemeClr val="accent2">
-                    <a:lumMod val="75000"/>
-                  </a:schemeClr>
-                </a:solidFill>
-                <a:latin typeface="Gill Sans Light" charset="0"/>
-                <a:ea typeface="Gill Sans Light" charset="0"/>
-                <a:cs typeface="Gill Sans Light" charset="0"/>
-              </a:rPr>
-              <a:t>queue </a:t>
-            </a:r>
-            <a:r>
-              <a:rPr lang="en-US" dirty="0" smtClean="0">
-                <a:solidFill>
-                  <a:schemeClr val="tx1"/>
-                </a:solidFill>
-                <a:latin typeface="Gill Sans Light" charset="0"/>
-                <a:ea typeface="Gill Sans Light" charset="0"/>
-                <a:cs typeface="Gill Sans Light" charset="0"/>
-              </a:rPr>
-              <a:t>as possible to A. </a:t>
-            </a:r>
-          </a:p>
-        </p:txBody>
-      </p:sp>
+            </a:ln>
+            <a:effectLst/>
+          </p:spPr>
+          <p:style>
+            <a:lnRef idx="2">
+              <a:schemeClr val="accent1">
+                <a:shade val="50000"/>
+              </a:schemeClr>
+            </a:lnRef>
+            <a:fillRef idx="1">
+              <a:schemeClr val="accent1"/>
+            </a:fillRef>
+            <a:effectRef idx="0">
+              <a:schemeClr val="accent1"/>
+            </a:effectRef>
+            <a:fontRef idx="minor">
+              <a:schemeClr val="lt1"/>
+            </a:fontRef>
+          </p:style>
+          <p:txBody>
+            <a:bodyPr rtlCol="0" anchor="ctr"/>
+            <a:lstStyle/>
+            <a:p>
+              <a:pPr algn="ctr"/>
+              <a:r>
+                <a:rPr lang="en-US" dirty="0" smtClean="0">
+                  <a:solidFill>
+                    <a:schemeClr val="tx1"/>
+                  </a:solidFill>
+                  <a:latin typeface="Gill Sans" charset="0"/>
+                  <a:ea typeface="Gill Sans" charset="0"/>
+                  <a:cs typeface="Gill Sans" charset="0"/>
+                </a:rPr>
+                <a:t>5. Process Balance Update for ‘t’ received from A </a:t>
+              </a:r>
+            </a:p>
+            <a:p>
+              <a:r>
+                <a:rPr lang="en-US" dirty="0" smtClean="0">
+                  <a:solidFill>
+                    <a:schemeClr val="tx1"/>
+                  </a:solidFill>
+                  <a:latin typeface="Gill Sans Light" charset="0"/>
+                  <a:ea typeface="Gill Sans Light" charset="0"/>
+                  <a:cs typeface="Gill Sans Light" charset="0"/>
+                </a:rPr>
+                <a:t>Remove ‘t’ from </a:t>
+              </a:r>
+              <a:r>
+                <a:rPr lang="en-US" dirty="0" smtClean="0">
+                  <a:solidFill>
+                    <a:schemeClr val="accent2">
+                      <a:lumMod val="75000"/>
+                    </a:schemeClr>
+                  </a:solidFill>
+                  <a:latin typeface="Gill Sans Light" charset="0"/>
+                  <a:ea typeface="Gill Sans Light" charset="0"/>
+                  <a:cs typeface="Gill Sans Light" charset="0"/>
+                </a:rPr>
+                <a:t>in-flight incoming</a:t>
+              </a:r>
+              <a:r>
+                <a:rPr lang="en-US" dirty="0" smtClean="0">
+                  <a:solidFill>
+                    <a:schemeClr val="tx1"/>
+                  </a:solidFill>
+                  <a:latin typeface="Gill Sans Light" charset="0"/>
+                  <a:ea typeface="Gill Sans Light" charset="0"/>
+                  <a:cs typeface="Gill Sans Light" charset="0"/>
+                </a:rPr>
+                <a:t>.</a:t>
+              </a:r>
+            </a:p>
+            <a:p>
+              <a:r>
+                <a:rPr lang="en-US" dirty="0" smtClean="0">
+                  <a:solidFill>
+                    <a:schemeClr val="accent2">
+                      <a:lumMod val="75000"/>
+                    </a:schemeClr>
+                  </a:solidFill>
+                  <a:latin typeface="Gill Sans Light" charset="0"/>
+                  <a:ea typeface="Gill Sans Light" charset="0"/>
+                  <a:cs typeface="Gill Sans Light" charset="0"/>
+                </a:rPr>
+                <a:t>balance</a:t>
+              </a:r>
+              <a:r>
+                <a:rPr lang="en-US" dirty="0" smtClean="0">
+                  <a:solidFill>
+                    <a:schemeClr val="tx1"/>
+                  </a:solidFill>
+                  <a:latin typeface="Gill Sans Light" charset="0"/>
+                  <a:ea typeface="Gill Sans Light" charset="0"/>
+                  <a:cs typeface="Gill Sans Light" charset="0"/>
+                </a:rPr>
+                <a:t> += x</a:t>
+              </a:r>
+            </a:p>
+            <a:p>
+              <a:r>
+                <a:rPr lang="en-US" dirty="0" smtClean="0">
+                  <a:solidFill>
+                    <a:schemeClr val="tx1"/>
+                  </a:solidFill>
+                  <a:latin typeface="Gill Sans Light" charset="0"/>
+                  <a:ea typeface="Gill Sans Light" charset="0"/>
+                  <a:cs typeface="Gill Sans Light" charset="0"/>
+                </a:rPr>
+                <a:t>Send as many HTLC in </a:t>
+              </a:r>
+              <a:r>
+                <a:rPr lang="en-US" dirty="0" smtClean="0">
+                  <a:solidFill>
+                    <a:schemeClr val="accent2">
+                      <a:lumMod val="75000"/>
+                    </a:schemeClr>
+                  </a:solidFill>
+                  <a:latin typeface="Gill Sans Light" charset="0"/>
+                  <a:ea typeface="Gill Sans Light" charset="0"/>
+                  <a:cs typeface="Gill Sans Light" charset="0"/>
+                </a:rPr>
+                <a:t>queue </a:t>
+              </a:r>
+              <a:r>
+                <a:rPr lang="en-US" dirty="0" smtClean="0">
+                  <a:solidFill>
+                    <a:schemeClr val="tx1"/>
+                  </a:solidFill>
+                  <a:latin typeface="Gill Sans Light" charset="0"/>
+                  <a:ea typeface="Gill Sans Light" charset="0"/>
+                  <a:cs typeface="Gill Sans Light" charset="0"/>
+                </a:rPr>
+                <a:t>as possible to A. </a:t>
+              </a:r>
+            </a:p>
+          </p:txBody>
+        </p:sp>
+      </p:grpSp>
     </p:spTree>
     <p:extLst>
       <p:ext uri="{BB962C8B-B14F-4D97-AF65-F5344CB8AC3E}">

</xml_diff>